<commit_message>
Hoàn thành 7.2.2.1 Tổ chức và lưu trữ thông tin linh động (tập các attribute) theo dạng Tag
</commit_message>
<xml_diff>
--- a/Documents/Thesis Report Picture.pptx
+++ b/Documents/Thesis Report Picture.pptx
@@ -21,6 +21,7 @@
     <p:sldId id="268" r:id="rId15"/>
     <p:sldId id="270" r:id="rId16"/>
     <p:sldId id="271" r:id="rId17"/>
+    <p:sldId id="272" r:id="rId18"/>
   </p:sldIdLst>
   <p:sldSz cx="9144000" cy="6858000" type="screen4x3"/>
   <p:notesSz cx="6858000" cy="9144000"/>
@@ -14810,6 +14811,674 @@
 </p:sld>
 </file>
 
+<file path=ppt/slides/slide17.xml><?xml version="1.0" encoding="utf-8"?>
+<p:sld xmlns:a="http://schemas.openxmlformats.org/drawingml/2006/main" xmlns:r="http://schemas.openxmlformats.org/officeDocument/2006/relationships" xmlns:p="http://schemas.openxmlformats.org/presentationml/2006/main">
+  <p:cSld>
+    <p:spTree>
+      <p:nvGrpSpPr>
+        <p:cNvPr id="1" name=""/>
+        <p:cNvGrpSpPr/>
+        <p:nvPr/>
+      </p:nvGrpSpPr>
+      <p:grpSpPr>
+        <a:xfrm>
+          <a:off x="0" y="0"/>
+          <a:ext cx="0" cy="0"/>
+          <a:chOff x="0" y="0"/>
+          <a:chExt cx="0" cy="0"/>
+        </a:xfrm>
+      </p:grpSpPr>
+      <p:pic>
+        <p:nvPicPr>
+          <p:cNvPr id="4" name="Picture 3"/>
+          <p:cNvPicPr>
+            <a:picLocks noChangeAspect="1"/>
+          </p:cNvPicPr>
+          <p:nvPr/>
+        </p:nvPicPr>
+        <p:blipFill>
+          <a:blip r:embed="rId2">
+            <a:extLst>
+              <a:ext uri="{28A0092B-C50C-407E-A947-70E740481C1C}">
+                <a14:useLocalDpi xmlns:a14="http://schemas.microsoft.com/office/drawing/2010/main" val="0"/>
+              </a:ext>
+            </a:extLst>
+          </a:blip>
+          <a:stretch>
+            <a:fillRect/>
+          </a:stretch>
+        </p:blipFill>
+        <p:spPr>
+          <a:xfrm>
+            <a:off x="383160" y="656503"/>
+            <a:ext cx="8409524" cy="5514286"/>
+          </a:xfrm>
+          <a:prstGeom prst="rect">
+            <a:avLst/>
+          </a:prstGeom>
+        </p:spPr>
+      </p:pic>
+      <p:sp>
+        <p:nvSpPr>
+          <p:cNvPr id="5" name="Rounded Rectangle 4"/>
+          <p:cNvSpPr/>
+          <p:nvPr/>
+        </p:nvSpPr>
+        <p:spPr>
+          <a:xfrm>
+            <a:off x="0" y="2057400"/>
+            <a:ext cx="2514600" cy="2362200"/>
+          </a:xfrm>
+          <a:prstGeom prst="roundRect">
+            <a:avLst/>
+          </a:prstGeom>
+          <a:noFill/>
+          <a:ln>
+            <a:solidFill>
+              <a:srgbClr val="FF0000"/>
+            </a:solidFill>
+          </a:ln>
+        </p:spPr>
+        <p:style>
+          <a:lnRef idx="2">
+            <a:schemeClr val="accent1">
+              <a:shade val="50000"/>
+            </a:schemeClr>
+          </a:lnRef>
+          <a:fillRef idx="1">
+            <a:schemeClr val="accent1"/>
+          </a:fillRef>
+          <a:effectRef idx="0">
+            <a:schemeClr val="accent1"/>
+          </a:effectRef>
+          <a:fontRef idx="minor">
+            <a:schemeClr val="lt1"/>
+          </a:fontRef>
+        </p:style>
+        <p:txBody>
+          <a:bodyPr rtlCol="0" anchor="t"/>
+          <a:lstStyle/>
+          <a:p>
+            <a:pPr algn="ctr"/>
+            <a:r>
+              <a:rPr lang="en-US" smtClean="0">
+                <a:solidFill>
+                  <a:schemeClr val="tx1"/>
+                </a:solidFill>
+              </a:rPr>
+              <a:t>Thông tin hồ ứng viên</a:t>
+            </a:r>
+            <a:endParaRPr lang="en-US">
+              <a:solidFill>
+                <a:schemeClr val="tx1"/>
+              </a:solidFill>
+            </a:endParaRPr>
+          </a:p>
+        </p:txBody>
+      </p:sp>
+      <p:sp>
+        <p:nvSpPr>
+          <p:cNvPr id="6" name="Rounded Rectangle 5"/>
+          <p:cNvSpPr/>
+          <p:nvPr/>
+        </p:nvSpPr>
+        <p:spPr>
+          <a:xfrm>
+            <a:off x="4587922" y="2057400"/>
+            <a:ext cx="2514600" cy="2552700"/>
+          </a:xfrm>
+          <a:prstGeom prst="roundRect">
+            <a:avLst/>
+          </a:prstGeom>
+          <a:noFill/>
+          <a:ln>
+            <a:solidFill>
+              <a:srgbClr val="FF0000"/>
+            </a:solidFill>
+          </a:ln>
+        </p:spPr>
+        <p:style>
+          <a:lnRef idx="2">
+            <a:schemeClr val="accent1">
+              <a:shade val="50000"/>
+            </a:schemeClr>
+          </a:lnRef>
+          <a:fillRef idx="1">
+            <a:schemeClr val="accent1"/>
+          </a:fillRef>
+          <a:effectRef idx="0">
+            <a:schemeClr val="accent1"/>
+          </a:effectRef>
+          <a:fontRef idx="minor">
+            <a:schemeClr val="lt1"/>
+          </a:fontRef>
+        </p:style>
+        <p:txBody>
+          <a:bodyPr rtlCol="0" anchor="t"/>
+          <a:lstStyle/>
+          <a:p>
+            <a:pPr algn="ctr"/>
+            <a:r>
+              <a:rPr lang="en-US" smtClean="0">
+                <a:solidFill>
+                  <a:schemeClr val="tx1"/>
+                </a:solidFill>
+              </a:rPr>
+              <a:t>Hồ sơ công việc</a:t>
+            </a:r>
+            <a:endParaRPr lang="en-US">
+              <a:solidFill>
+                <a:schemeClr val="tx1"/>
+              </a:solidFill>
+            </a:endParaRPr>
+          </a:p>
+        </p:txBody>
+      </p:sp>
+      <p:sp>
+        <p:nvSpPr>
+          <p:cNvPr id="7" name="Rounded Rectangle 6"/>
+          <p:cNvSpPr/>
+          <p:nvPr/>
+        </p:nvSpPr>
+        <p:spPr>
+          <a:xfrm>
+            <a:off x="2217761" y="4419600"/>
+            <a:ext cx="1981200" cy="1828800"/>
+          </a:xfrm>
+          <a:prstGeom prst="roundRect">
+            <a:avLst/>
+          </a:prstGeom>
+          <a:noFill/>
+          <a:ln>
+            <a:solidFill>
+              <a:srgbClr val="FFC000"/>
+            </a:solidFill>
+            <a:prstDash val="dash"/>
+          </a:ln>
+        </p:spPr>
+        <p:style>
+          <a:lnRef idx="2">
+            <a:schemeClr val="accent1">
+              <a:shade val="50000"/>
+            </a:schemeClr>
+          </a:lnRef>
+          <a:fillRef idx="1">
+            <a:schemeClr val="accent1"/>
+          </a:fillRef>
+          <a:effectRef idx="0">
+            <a:schemeClr val="accent1"/>
+          </a:effectRef>
+          <a:fontRef idx="minor">
+            <a:schemeClr val="lt1"/>
+          </a:fontRef>
+        </p:style>
+        <p:txBody>
+          <a:bodyPr rtlCol="0" anchor="b"/>
+          <a:lstStyle/>
+          <a:p>
+            <a:pPr algn="ctr"/>
+            <a:r>
+              <a:rPr lang="en-US" sz="1200" b="1" smtClean="0">
+                <a:solidFill>
+                  <a:schemeClr val="tx1"/>
+                </a:solidFill>
+              </a:rPr>
+              <a:t>&lt;&lt;Mô hình thông tin 3&gt;&gt;</a:t>
+            </a:r>
+            <a:endParaRPr lang="en-US" sz="1200" b="1">
+              <a:solidFill>
+                <a:schemeClr val="tx1"/>
+              </a:solidFill>
+            </a:endParaRPr>
+          </a:p>
+        </p:txBody>
+      </p:sp>
+      <p:sp>
+        <p:nvSpPr>
+          <p:cNvPr id="8" name="Rounded Rectangle 7"/>
+          <p:cNvSpPr/>
+          <p:nvPr/>
+        </p:nvSpPr>
+        <p:spPr>
+          <a:xfrm>
+            <a:off x="2362199" y="2560093"/>
+            <a:ext cx="1981201" cy="1707107"/>
+          </a:xfrm>
+          <a:prstGeom prst="roundRect">
+            <a:avLst/>
+          </a:prstGeom>
+          <a:noFill/>
+          <a:ln>
+            <a:solidFill>
+              <a:srgbClr val="FFC000"/>
+            </a:solidFill>
+            <a:prstDash val="dash"/>
+          </a:ln>
+        </p:spPr>
+        <p:style>
+          <a:lnRef idx="2">
+            <a:schemeClr val="accent1">
+              <a:shade val="50000"/>
+            </a:schemeClr>
+          </a:lnRef>
+          <a:fillRef idx="1">
+            <a:schemeClr val="accent1"/>
+          </a:fillRef>
+          <a:effectRef idx="0">
+            <a:schemeClr val="accent1"/>
+          </a:effectRef>
+          <a:fontRef idx="minor">
+            <a:schemeClr val="lt1"/>
+          </a:fontRef>
+        </p:style>
+        <p:txBody>
+          <a:bodyPr rtlCol="0" anchor="t"/>
+          <a:lstStyle/>
+          <a:p>
+            <a:pPr algn="ctr"/>
+            <a:r>
+              <a:rPr lang="en-US" sz="1200" b="1">
+                <a:solidFill>
+                  <a:schemeClr val="tx1"/>
+                </a:solidFill>
+              </a:rPr>
+              <a:t>&lt;&lt;Mô hình thông </a:t>
+            </a:r>
+            <a:r>
+              <a:rPr lang="en-US" sz="1200" b="1">
+                <a:solidFill>
+                  <a:schemeClr val="tx1"/>
+                </a:solidFill>
+              </a:rPr>
+              <a:t>tin </a:t>
+            </a:r>
+            <a:r>
+              <a:rPr lang="en-US" sz="1200" b="1" smtClean="0">
+                <a:solidFill>
+                  <a:schemeClr val="tx1"/>
+                </a:solidFill>
+              </a:rPr>
+              <a:t>2</a:t>
+            </a:r>
+            <a:r>
+              <a:rPr lang="en-US" sz="1200" b="1" smtClean="0">
+                <a:solidFill>
+                  <a:schemeClr val="tx1"/>
+                </a:solidFill>
+              </a:rPr>
+              <a:t>&gt;&gt;</a:t>
+            </a:r>
+            <a:endParaRPr lang="en-US" sz="1200" b="1">
+              <a:solidFill>
+                <a:schemeClr val="tx1"/>
+              </a:solidFill>
+            </a:endParaRPr>
+          </a:p>
+        </p:txBody>
+      </p:sp>
+      <p:sp>
+        <p:nvSpPr>
+          <p:cNvPr id="10" name="Rounded Rectangle 9"/>
+          <p:cNvSpPr/>
+          <p:nvPr/>
+        </p:nvSpPr>
+        <p:spPr>
+          <a:xfrm>
+            <a:off x="2201839" y="389530"/>
+            <a:ext cx="1981200" cy="1828800"/>
+          </a:xfrm>
+          <a:prstGeom prst="roundRect">
+            <a:avLst/>
+          </a:prstGeom>
+          <a:noFill/>
+          <a:ln>
+            <a:solidFill>
+              <a:srgbClr val="FFC000"/>
+            </a:solidFill>
+            <a:prstDash val="dash"/>
+          </a:ln>
+        </p:spPr>
+        <p:style>
+          <a:lnRef idx="2">
+            <a:schemeClr val="accent1">
+              <a:shade val="50000"/>
+            </a:schemeClr>
+          </a:lnRef>
+          <a:fillRef idx="1">
+            <a:schemeClr val="accent1"/>
+          </a:fillRef>
+          <a:effectRef idx="0">
+            <a:schemeClr val="accent1"/>
+          </a:effectRef>
+          <a:fontRef idx="minor">
+            <a:schemeClr val="lt1"/>
+          </a:fontRef>
+        </p:style>
+        <p:txBody>
+          <a:bodyPr rtlCol="0" anchor="t"/>
+          <a:lstStyle/>
+          <a:p>
+            <a:pPr algn="ctr"/>
+            <a:r>
+              <a:rPr lang="en-US" sz="1200" b="1" smtClean="0">
+                <a:solidFill>
+                  <a:schemeClr val="tx1"/>
+                </a:solidFill>
+              </a:rPr>
+              <a:t>&lt;&lt;Mô hình thông tin 1&gt;&gt;</a:t>
+            </a:r>
+            <a:endParaRPr lang="en-US" sz="1200" b="1">
+              <a:solidFill>
+                <a:schemeClr val="tx1"/>
+              </a:solidFill>
+            </a:endParaRPr>
+          </a:p>
+        </p:txBody>
+      </p:sp>
+      <p:cxnSp>
+        <p:nvCxnSpPr>
+          <p:cNvPr id="12" name="Curved Connector 11"/>
+          <p:cNvCxnSpPr>
+            <a:stCxn id="10" idx="1"/>
+          </p:cNvCxnSpPr>
+          <p:nvPr/>
+        </p:nvCxnSpPr>
+        <p:spPr>
+          <a:xfrm rot="10800000" flipV="1">
+            <a:off x="1257301" y="1303930"/>
+            <a:ext cx="944539" cy="914400"/>
+          </a:xfrm>
+          <a:prstGeom prst="curvedConnector3">
+            <a:avLst/>
+          </a:prstGeom>
+          <a:ln>
+            <a:solidFill>
+              <a:srgbClr val="C00000"/>
+            </a:solidFill>
+            <a:tailEnd type="arrow"/>
+          </a:ln>
+        </p:spPr>
+        <p:style>
+          <a:lnRef idx="1">
+            <a:schemeClr val="accent1"/>
+          </a:lnRef>
+          <a:fillRef idx="0">
+            <a:schemeClr val="accent1"/>
+          </a:fillRef>
+          <a:effectRef idx="0">
+            <a:schemeClr val="accent1"/>
+          </a:effectRef>
+          <a:fontRef idx="minor">
+            <a:schemeClr val="tx1"/>
+          </a:fontRef>
+        </p:style>
+      </p:cxnSp>
+      <p:cxnSp>
+        <p:nvCxnSpPr>
+          <p:cNvPr id="14" name="Curved Connector 13"/>
+          <p:cNvCxnSpPr/>
+          <p:nvPr/>
+        </p:nvCxnSpPr>
+        <p:spPr>
+          <a:xfrm rot="10800000">
+            <a:off x="1524000" y="2819400"/>
+            <a:ext cx="1295400" cy="514350"/>
+          </a:xfrm>
+          <a:prstGeom prst="curvedConnector3">
+            <a:avLst/>
+          </a:prstGeom>
+          <a:ln>
+            <a:solidFill>
+              <a:srgbClr val="C00000"/>
+            </a:solidFill>
+            <a:tailEnd type="arrow"/>
+          </a:ln>
+        </p:spPr>
+        <p:style>
+          <a:lnRef idx="1">
+            <a:schemeClr val="accent1"/>
+          </a:lnRef>
+          <a:fillRef idx="0">
+            <a:schemeClr val="accent1"/>
+          </a:fillRef>
+          <a:effectRef idx="0">
+            <a:schemeClr val="accent1"/>
+          </a:effectRef>
+          <a:fontRef idx="minor">
+            <a:schemeClr val="tx1"/>
+          </a:fontRef>
+        </p:style>
+      </p:cxnSp>
+      <p:cxnSp>
+        <p:nvCxnSpPr>
+          <p:cNvPr id="16" name="Curved Connector 15"/>
+          <p:cNvCxnSpPr/>
+          <p:nvPr/>
+        </p:nvCxnSpPr>
+        <p:spPr>
+          <a:xfrm rot="16200000" flipV="1">
+            <a:off x="1321985" y="3988985"/>
+            <a:ext cx="1752600" cy="937430"/>
+          </a:xfrm>
+          <a:prstGeom prst="curvedConnector3">
+            <a:avLst/>
+          </a:prstGeom>
+          <a:ln>
+            <a:solidFill>
+              <a:srgbClr val="C00000"/>
+            </a:solidFill>
+            <a:tailEnd type="arrow"/>
+          </a:ln>
+        </p:spPr>
+        <p:style>
+          <a:lnRef idx="1">
+            <a:schemeClr val="accent1"/>
+          </a:lnRef>
+          <a:fillRef idx="0">
+            <a:schemeClr val="accent1"/>
+          </a:fillRef>
+          <a:effectRef idx="0">
+            <a:schemeClr val="accent1"/>
+          </a:effectRef>
+          <a:fontRef idx="minor">
+            <a:schemeClr val="tx1"/>
+          </a:fontRef>
+        </p:style>
+      </p:cxnSp>
+      <p:sp>
+        <p:nvSpPr>
+          <p:cNvPr id="17" name="Rounded Rectangle 16"/>
+          <p:cNvSpPr/>
+          <p:nvPr/>
+        </p:nvSpPr>
+        <p:spPr>
+          <a:xfrm>
+            <a:off x="4572000" y="76200"/>
+            <a:ext cx="1273222" cy="1447800"/>
+          </a:xfrm>
+          <a:prstGeom prst="roundRect">
+            <a:avLst/>
+          </a:prstGeom>
+          <a:noFill/>
+          <a:ln>
+            <a:solidFill>
+              <a:srgbClr val="FF0000"/>
+            </a:solidFill>
+          </a:ln>
+        </p:spPr>
+        <p:style>
+          <a:lnRef idx="2">
+            <a:schemeClr val="accent1">
+              <a:shade val="50000"/>
+            </a:schemeClr>
+          </a:lnRef>
+          <a:fillRef idx="1">
+            <a:schemeClr val="accent1"/>
+          </a:fillRef>
+          <a:effectRef idx="0">
+            <a:schemeClr val="accent1"/>
+          </a:effectRef>
+          <a:fontRef idx="minor">
+            <a:schemeClr val="lt1"/>
+          </a:fontRef>
+        </p:style>
+        <p:txBody>
+          <a:bodyPr rtlCol="0" anchor="ctr"/>
+          <a:lstStyle/>
+          <a:p>
+            <a:pPr algn="ctr"/>
+            <a:r>
+              <a:rPr lang="en-US" sz="1500" smtClean="0">
+                <a:solidFill>
+                  <a:schemeClr val="tx1"/>
+                </a:solidFill>
+              </a:rPr>
+              <a:t>Doanh nghiệp</a:t>
+            </a:r>
+            <a:endParaRPr lang="en-US" sz="1500">
+              <a:solidFill>
+                <a:schemeClr val="tx1"/>
+              </a:solidFill>
+            </a:endParaRPr>
+          </a:p>
+        </p:txBody>
+      </p:sp>
+      <p:sp>
+        <p:nvSpPr>
+          <p:cNvPr id="18" name="Rounded Rectangle 17"/>
+          <p:cNvSpPr/>
+          <p:nvPr/>
+        </p:nvSpPr>
+        <p:spPr>
+          <a:xfrm>
+            <a:off x="250777" y="5105400"/>
+            <a:ext cx="1273222" cy="1447800"/>
+          </a:xfrm>
+          <a:prstGeom prst="roundRect">
+            <a:avLst/>
+          </a:prstGeom>
+          <a:noFill/>
+          <a:ln>
+            <a:solidFill>
+              <a:srgbClr val="FF0000"/>
+            </a:solidFill>
+          </a:ln>
+        </p:spPr>
+        <p:style>
+          <a:lnRef idx="2">
+            <a:schemeClr val="accent1">
+              <a:shade val="50000"/>
+            </a:schemeClr>
+          </a:lnRef>
+          <a:fillRef idx="1">
+            <a:schemeClr val="accent1"/>
+          </a:fillRef>
+          <a:effectRef idx="0">
+            <a:schemeClr val="accent1"/>
+          </a:effectRef>
+          <a:fontRef idx="minor">
+            <a:schemeClr val="lt1"/>
+          </a:fontRef>
+        </p:style>
+        <p:txBody>
+          <a:bodyPr rtlCol="0" anchor="ctr"/>
+          <a:lstStyle/>
+          <a:p>
+            <a:pPr algn="ctr"/>
+            <a:r>
+              <a:rPr lang="en-US" sz="1500" smtClean="0">
+                <a:solidFill>
+                  <a:schemeClr val="tx1"/>
+                </a:solidFill>
+              </a:rPr>
+              <a:t>Ngành nghề</a:t>
+            </a:r>
+            <a:endParaRPr lang="en-US" sz="1500">
+              <a:solidFill>
+                <a:schemeClr val="tx1"/>
+              </a:solidFill>
+            </a:endParaRPr>
+          </a:p>
+        </p:txBody>
+      </p:sp>
+      <p:sp>
+        <p:nvSpPr>
+          <p:cNvPr id="19" name="Rounded Rectangle 18"/>
+          <p:cNvSpPr/>
+          <p:nvPr/>
+        </p:nvSpPr>
+        <p:spPr>
+          <a:xfrm>
+            <a:off x="4341125" y="5334000"/>
+            <a:ext cx="1273222" cy="1447800"/>
+          </a:xfrm>
+          <a:prstGeom prst="roundRect">
+            <a:avLst/>
+          </a:prstGeom>
+          <a:noFill/>
+          <a:ln>
+            <a:solidFill>
+              <a:srgbClr val="FF0000"/>
+            </a:solidFill>
+          </a:ln>
+        </p:spPr>
+        <p:style>
+          <a:lnRef idx="2">
+            <a:schemeClr val="accent1">
+              <a:shade val="50000"/>
+            </a:schemeClr>
+          </a:lnRef>
+          <a:fillRef idx="1">
+            <a:schemeClr val="accent1"/>
+          </a:fillRef>
+          <a:effectRef idx="0">
+            <a:schemeClr val="accent1"/>
+          </a:effectRef>
+          <a:fontRef idx="minor">
+            <a:schemeClr val="lt1"/>
+          </a:fontRef>
+        </p:style>
+        <p:txBody>
+          <a:bodyPr rtlCol="0" anchor="ctr"/>
+          <a:lstStyle/>
+          <a:p>
+            <a:pPr algn="ctr"/>
+            <a:r>
+              <a:rPr lang="en-US" sz="1500" smtClean="0">
+                <a:solidFill>
+                  <a:schemeClr val="tx1"/>
+                </a:solidFill>
+              </a:rPr>
+              <a:t>Vị trí công việc</a:t>
+            </a:r>
+            <a:endParaRPr lang="en-US" sz="1500">
+              <a:solidFill>
+                <a:schemeClr val="tx1"/>
+              </a:solidFill>
+            </a:endParaRPr>
+          </a:p>
+        </p:txBody>
+      </p:sp>
+    </p:spTree>
+    <p:extLst>
+      <p:ext uri="{BB962C8B-B14F-4D97-AF65-F5344CB8AC3E}">
+        <p14:creationId xmlns:p14="http://schemas.microsoft.com/office/powerpoint/2010/main" val="794813346"/>
+      </p:ext>
+    </p:extLst>
+  </p:cSld>
+  <p:clrMapOvr>
+    <a:masterClrMapping/>
+  </p:clrMapOvr>
+  <p:timing>
+    <p:tnLst>
+      <p:par>
+        <p:cTn id="1" dur="indefinite" restart="never" nodeType="tmRoot"/>
+      </p:par>
+    </p:tnLst>
+  </p:timing>
+</p:sld>
+</file>
+
 <file path=ppt/slides/slide2.xml><?xml version="1.0" encoding="utf-8"?>
 <p:sld xmlns:a="http://schemas.openxmlformats.org/drawingml/2006/main" xmlns:r="http://schemas.openxmlformats.org/officeDocument/2006/relationships" xmlns:p="http://schemas.openxmlformats.org/presentationml/2006/main">
   <p:cSld>

</xml_diff>

<commit_message>
Hoàn thành 7.2.2.2 Mapping; Giải pháp mô hình hóa thông tin cấu trúc của người dùng thành tập các attribute dạng Tag
</commit_message>
<xml_diff>
--- a/Documents/Thesis Report Picture.pptx
+++ b/Documents/Thesis Report Picture.pptx
@@ -23,6 +23,7 @@
     <p:sldId id="271" r:id="rId17"/>
     <p:sldId id="272" r:id="rId18"/>
     <p:sldId id="273" r:id="rId19"/>
+    <p:sldId id="274" r:id="rId20"/>
   </p:sldIdLst>
   <p:sldSz cx="9144000" cy="6858000" type="screen4x3"/>
   <p:notesSz cx="6858000" cy="9144000"/>
@@ -16172,6 +16173,582 @@
 </p:sld>
 </file>
 
+<file path=ppt/slides/slide19.xml><?xml version="1.0" encoding="utf-8"?>
+<p:sld xmlns:a="http://schemas.openxmlformats.org/drawingml/2006/main" xmlns:r="http://schemas.openxmlformats.org/officeDocument/2006/relationships" xmlns:p="http://schemas.openxmlformats.org/presentationml/2006/main">
+  <p:cSld>
+    <p:spTree>
+      <p:nvGrpSpPr>
+        <p:cNvPr id="1" name=""/>
+        <p:cNvGrpSpPr/>
+        <p:nvPr/>
+      </p:nvGrpSpPr>
+      <p:grpSpPr>
+        <a:xfrm>
+          <a:off x="0" y="0"/>
+          <a:ext cx="0" cy="0"/>
+          <a:chOff x="0" y="0"/>
+          <a:chExt cx="0" cy="0"/>
+        </a:xfrm>
+      </p:grpSpPr>
+      <p:pic>
+        <p:nvPicPr>
+          <p:cNvPr id="4098" name="Picture 2"/>
+          <p:cNvPicPr>
+            <a:picLocks noChangeAspect="1" noChangeArrowheads="1"/>
+          </p:cNvPicPr>
+          <p:nvPr/>
+        </p:nvPicPr>
+        <p:blipFill>
+          <a:blip r:embed="rId2">
+            <a:extLst>
+              <a:ext uri="{28A0092B-C50C-407E-A947-70E740481C1C}">
+                <a14:useLocalDpi xmlns:a14="http://schemas.microsoft.com/office/drawing/2010/main" val="0"/>
+              </a:ext>
+            </a:extLst>
+          </a:blip>
+          <a:srcRect/>
+          <a:stretch>
+            <a:fillRect/>
+          </a:stretch>
+        </p:blipFill>
+        <p:spPr bwMode="auto">
+          <a:xfrm>
+            <a:off x="3558724" y="2475291"/>
+            <a:ext cx="1514475" cy="2409825"/>
+          </a:xfrm>
+          <a:prstGeom prst="rect">
+            <a:avLst/>
+          </a:prstGeom>
+          <a:noFill/>
+          <a:ln>
+            <a:noFill/>
+          </a:ln>
+          <a:effectLst/>
+          <a:extLst>
+            <a:ext uri="{909E8E84-426E-40DD-AFC4-6F175D3DCCD1}">
+              <a14:hiddenFill xmlns:a14="http://schemas.microsoft.com/office/drawing/2010/main">
+                <a:solidFill>
+                  <a:schemeClr val="accent1"/>
+                </a:solidFill>
+              </a14:hiddenFill>
+            </a:ext>
+            <a:ext uri="{91240B29-F687-4F45-9708-019B960494DF}">
+              <a14:hiddenLine xmlns:a14="http://schemas.microsoft.com/office/drawing/2010/main" w="9525">
+                <a:solidFill>
+                  <a:schemeClr val="tx1"/>
+                </a:solidFill>
+                <a:miter lim="800000"/>
+                <a:headEnd/>
+                <a:tailEnd/>
+              </a14:hiddenLine>
+            </a:ext>
+            <a:ext uri="{AF507438-7753-43E0-B8FC-AC1667EBCBE1}">
+              <a14:hiddenEffects xmlns:a14="http://schemas.microsoft.com/office/drawing/2010/main">
+                <a:effectLst>
+                  <a:outerShdw dist="35921" dir="2700000" algn="ctr" rotWithShape="0">
+                    <a:schemeClr val="bg2"/>
+                  </a:outerShdw>
+                </a:effectLst>
+              </a14:hiddenEffects>
+            </a:ext>
+          </a:extLst>
+        </p:spPr>
+      </p:pic>
+      <p:sp>
+        <p:nvSpPr>
+          <p:cNvPr id="4" name="Rounded Rectangle 3"/>
+          <p:cNvSpPr/>
+          <p:nvPr/>
+        </p:nvSpPr>
+        <p:spPr>
+          <a:xfrm>
+            <a:off x="3406324" y="4190857"/>
+            <a:ext cx="1371600" cy="152400"/>
+          </a:xfrm>
+          <a:prstGeom prst="roundRect">
+            <a:avLst/>
+          </a:prstGeom>
+          <a:noFill/>
+          <a:ln>
+            <a:solidFill>
+              <a:srgbClr val="FF0000"/>
+            </a:solidFill>
+          </a:ln>
+        </p:spPr>
+        <p:style>
+          <a:lnRef idx="2">
+            <a:schemeClr val="accent1">
+              <a:shade val="50000"/>
+            </a:schemeClr>
+          </a:lnRef>
+          <a:fillRef idx="1">
+            <a:schemeClr val="accent1"/>
+          </a:fillRef>
+          <a:effectRef idx="0">
+            <a:schemeClr val="accent1"/>
+          </a:effectRef>
+          <a:fontRef idx="minor">
+            <a:schemeClr val="lt1"/>
+          </a:fontRef>
+        </p:style>
+        <p:txBody>
+          <a:bodyPr rtlCol="0" anchor="ctr"/>
+          <a:lstStyle/>
+          <a:p>
+            <a:pPr algn="ctr"/>
+            <a:endParaRPr lang="en-US"/>
+          </a:p>
+        </p:txBody>
+      </p:sp>
+      <p:sp>
+        <p:nvSpPr>
+          <p:cNvPr id="6" name="Rounded Rectangle 5"/>
+          <p:cNvSpPr/>
+          <p:nvPr/>
+        </p:nvSpPr>
+        <p:spPr>
+          <a:xfrm>
+            <a:off x="3406324" y="3840564"/>
+            <a:ext cx="1371600" cy="152400"/>
+          </a:xfrm>
+          <a:prstGeom prst="roundRect">
+            <a:avLst/>
+          </a:prstGeom>
+          <a:noFill/>
+          <a:ln>
+            <a:solidFill>
+              <a:srgbClr val="FF0000"/>
+            </a:solidFill>
+          </a:ln>
+        </p:spPr>
+        <p:style>
+          <a:lnRef idx="2">
+            <a:schemeClr val="accent1">
+              <a:shade val="50000"/>
+            </a:schemeClr>
+          </a:lnRef>
+          <a:fillRef idx="1">
+            <a:schemeClr val="accent1"/>
+          </a:fillRef>
+          <a:effectRef idx="0">
+            <a:schemeClr val="accent1"/>
+          </a:effectRef>
+          <a:fontRef idx="minor">
+            <a:schemeClr val="lt1"/>
+          </a:fontRef>
+        </p:style>
+        <p:txBody>
+          <a:bodyPr rtlCol="0" anchor="ctr"/>
+          <a:lstStyle/>
+          <a:p>
+            <a:pPr algn="ctr"/>
+            <a:endParaRPr lang="en-US"/>
+          </a:p>
+        </p:txBody>
+      </p:sp>
+      <p:pic>
+        <p:nvPicPr>
+          <p:cNvPr id="4099" name="Picture 3"/>
+          <p:cNvPicPr>
+            <a:picLocks noChangeAspect="1" noChangeArrowheads="1"/>
+          </p:cNvPicPr>
+          <p:nvPr/>
+        </p:nvPicPr>
+        <p:blipFill>
+          <a:blip r:embed="rId3">
+            <a:extLst>
+              <a:ext uri="{28A0092B-C50C-407E-A947-70E740481C1C}">
+                <a14:useLocalDpi xmlns:a14="http://schemas.microsoft.com/office/drawing/2010/main" val="0"/>
+              </a:ext>
+            </a:extLst>
+          </a:blip>
+          <a:srcRect/>
+          <a:stretch>
+            <a:fillRect/>
+          </a:stretch>
+        </p:blipFill>
+        <p:spPr bwMode="auto">
+          <a:xfrm>
+            <a:off x="7086600" y="1622803"/>
+            <a:ext cx="1485900" cy="4114800"/>
+          </a:xfrm>
+          <a:prstGeom prst="rect">
+            <a:avLst/>
+          </a:prstGeom>
+          <a:noFill/>
+          <a:ln>
+            <a:noFill/>
+          </a:ln>
+          <a:effectLst/>
+          <a:extLst>
+            <a:ext uri="{909E8E84-426E-40DD-AFC4-6F175D3DCCD1}">
+              <a14:hiddenFill xmlns:a14="http://schemas.microsoft.com/office/drawing/2010/main">
+                <a:solidFill>
+                  <a:schemeClr val="accent1"/>
+                </a:solidFill>
+              </a14:hiddenFill>
+            </a:ext>
+            <a:ext uri="{91240B29-F687-4F45-9708-019B960494DF}">
+              <a14:hiddenLine xmlns:a14="http://schemas.microsoft.com/office/drawing/2010/main" w="9525">
+                <a:solidFill>
+                  <a:schemeClr val="tx1"/>
+                </a:solidFill>
+                <a:miter lim="800000"/>
+                <a:headEnd/>
+                <a:tailEnd/>
+              </a14:hiddenLine>
+            </a:ext>
+            <a:ext uri="{AF507438-7753-43E0-B8FC-AC1667EBCBE1}">
+              <a14:hiddenEffects xmlns:a14="http://schemas.microsoft.com/office/drawing/2010/main">
+                <a:effectLst>
+                  <a:outerShdw dist="35921" dir="2700000" algn="ctr" rotWithShape="0">
+                    <a:schemeClr val="bg2"/>
+                  </a:outerShdw>
+                </a:effectLst>
+              </a14:hiddenEffects>
+            </a:ext>
+          </a:extLst>
+        </p:spPr>
+      </p:pic>
+      <p:cxnSp>
+        <p:nvCxnSpPr>
+          <p:cNvPr id="7" name="Curved Connector 6"/>
+          <p:cNvCxnSpPr>
+            <a:stCxn id="6" idx="3"/>
+          </p:cNvCxnSpPr>
+          <p:nvPr/>
+        </p:nvCxnSpPr>
+        <p:spPr>
+          <a:xfrm flipV="1">
+            <a:off x="4777924" y="3047857"/>
+            <a:ext cx="2362200" cy="868907"/>
+          </a:xfrm>
+          <a:prstGeom prst="curvedConnector3">
+            <a:avLst/>
+          </a:prstGeom>
+          <a:ln>
+            <a:tailEnd type="arrow"/>
+          </a:ln>
+        </p:spPr>
+        <p:style>
+          <a:lnRef idx="1">
+            <a:schemeClr val="accent1"/>
+          </a:lnRef>
+          <a:fillRef idx="0">
+            <a:schemeClr val="accent1"/>
+          </a:fillRef>
+          <a:effectRef idx="0">
+            <a:schemeClr val="accent1"/>
+          </a:effectRef>
+          <a:fontRef idx="minor">
+            <a:schemeClr val="tx1"/>
+          </a:fontRef>
+        </p:style>
+      </p:cxnSp>
+      <p:cxnSp>
+        <p:nvCxnSpPr>
+          <p:cNvPr id="11" name="Curved Connector 10"/>
+          <p:cNvCxnSpPr>
+            <a:stCxn id="4" idx="3"/>
+          </p:cNvCxnSpPr>
+          <p:nvPr/>
+        </p:nvCxnSpPr>
+        <p:spPr>
+          <a:xfrm flipV="1">
+            <a:off x="4777924" y="3840564"/>
+            <a:ext cx="2552700" cy="426493"/>
+          </a:xfrm>
+          <a:prstGeom prst="curvedConnector3">
+            <a:avLst/>
+          </a:prstGeom>
+          <a:ln>
+            <a:tailEnd type="arrow"/>
+          </a:ln>
+        </p:spPr>
+        <p:style>
+          <a:lnRef idx="1">
+            <a:schemeClr val="accent1"/>
+          </a:lnRef>
+          <a:fillRef idx="0">
+            <a:schemeClr val="accent1"/>
+          </a:fillRef>
+          <a:effectRef idx="0">
+            <a:schemeClr val="accent1"/>
+          </a:effectRef>
+          <a:fontRef idx="minor">
+            <a:schemeClr val="tx1"/>
+          </a:fontRef>
+        </p:style>
+      </p:cxnSp>
+      <p:sp>
+        <p:nvSpPr>
+          <p:cNvPr id="12" name="TextBox 11"/>
+          <p:cNvSpPr txBox="1"/>
+          <p:nvPr/>
+        </p:nvSpPr>
+        <p:spPr>
+          <a:xfrm>
+            <a:off x="5221418" y="2863191"/>
+            <a:ext cx="1416670" cy="323165"/>
+          </a:xfrm>
+          <a:prstGeom prst="rect">
+            <a:avLst/>
+          </a:prstGeom>
+          <a:noFill/>
+        </p:spPr>
+        <p:txBody>
+          <a:bodyPr wrap="none" rtlCol="0">
+            <a:spAutoFit/>
+          </a:bodyPr>
+          <a:lstStyle/>
+          <a:p>
+            <a:r>
+              <a:rPr lang="en-US" sz="1500"/>
+              <a:t>n</a:t>
+            </a:r>
+            <a:r>
+              <a:rPr lang="en-US" sz="1500" smtClean="0"/>
+              <a:t>ew instance of</a:t>
+            </a:r>
+            <a:endParaRPr lang="en-US" sz="1500"/>
+          </a:p>
+        </p:txBody>
+      </p:sp>
+      <p:sp>
+        <p:nvSpPr>
+          <p:cNvPr id="17" name="TextBox 16"/>
+          <p:cNvSpPr txBox="1"/>
+          <p:nvPr/>
+        </p:nvSpPr>
+        <p:spPr>
+          <a:xfrm>
+            <a:off x="5244164" y="3992964"/>
+            <a:ext cx="1416670" cy="323165"/>
+          </a:xfrm>
+          <a:prstGeom prst="rect">
+            <a:avLst/>
+          </a:prstGeom>
+          <a:noFill/>
+        </p:spPr>
+        <p:txBody>
+          <a:bodyPr wrap="none" rtlCol="0">
+            <a:spAutoFit/>
+          </a:bodyPr>
+          <a:lstStyle/>
+          <a:p>
+            <a:r>
+              <a:rPr lang="en-US" sz="1500"/>
+              <a:t>n</a:t>
+            </a:r>
+            <a:r>
+              <a:rPr lang="en-US" sz="1500" smtClean="0"/>
+              <a:t>ew instance of</a:t>
+            </a:r>
+            <a:endParaRPr lang="en-US" sz="1500"/>
+          </a:p>
+        </p:txBody>
+      </p:sp>
+      <p:pic>
+        <p:nvPicPr>
+          <p:cNvPr id="4100" name="Picture 4"/>
+          <p:cNvPicPr>
+            <a:picLocks noChangeAspect="1" noChangeArrowheads="1"/>
+          </p:cNvPicPr>
+          <p:nvPr/>
+        </p:nvPicPr>
+        <p:blipFill>
+          <a:blip r:embed="rId4">
+            <a:extLst>
+              <a:ext uri="{28A0092B-C50C-407E-A947-70E740481C1C}">
+                <a14:useLocalDpi xmlns:a14="http://schemas.microsoft.com/office/drawing/2010/main" val="0"/>
+              </a:ext>
+            </a:extLst>
+          </a:blip>
+          <a:srcRect/>
+          <a:stretch>
+            <a:fillRect/>
+          </a:stretch>
+        </p:blipFill>
+        <p:spPr bwMode="auto">
+          <a:xfrm>
+            <a:off x="-241751" y="2475291"/>
+            <a:ext cx="3648075" cy="2581275"/>
+          </a:xfrm>
+          <a:prstGeom prst="rect">
+            <a:avLst/>
+          </a:prstGeom>
+          <a:noFill/>
+          <a:ln>
+            <a:noFill/>
+          </a:ln>
+          <a:effectLst/>
+          <a:extLst>
+            <a:ext uri="{909E8E84-426E-40DD-AFC4-6F175D3DCCD1}">
+              <a14:hiddenFill xmlns:a14="http://schemas.microsoft.com/office/drawing/2010/main">
+                <a:solidFill>
+                  <a:schemeClr val="accent1"/>
+                </a:solidFill>
+              </a14:hiddenFill>
+            </a:ext>
+            <a:ext uri="{91240B29-F687-4F45-9708-019B960494DF}">
+              <a14:hiddenLine xmlns:a14="http://schemas.microsoft.com/office/drawing/2010/main" w="9525">
+                <a:solidFill>
+                  <a:schemeClr val="tx1"/>
+                </a:solidFill>
+                <a:miter lim="800000"/>
+                <a:headEnd/>
+                <a:tailEnd/>
+              </a14:hiddenLine>
+            </a:ext>
+            <a:ext uri="{AF507438-7753-43E0-B8FC-AC1667EBCBE1}">
+              <a14:hiddenEffects xmlns:a14="http://schemas.microsoft.com/office/drawing/2010/main">
+                <a:effectLst>
+                  <a:outerShdw dist="35921" dir="2700000" algn="ctr" rotWithShape="0">
+                    <a:schemeClr val="bg2"/>
+                  </a:outerShdw>
+                </a:effectLst>
+              </a14:hiddenEffects>
+            </a:ext>
+          </a:extLst>
+        </p:spPr>
+      </p:pic>
+      <p:sp>
+        <p:nvSpPr>
+          <p:cNvPr id="15" name="TextBox 14"/>
+          <p:cNvSpPr txBox="1"/>
+          <p:nvPr/>
+        </p:nvSpPr>
+        <p:spPr>
+          <a:xfrm>
+            <a:off x="3396799" y="2152126"/>
+            <a:ext cx="1989455" cy="323165"/>
+          </a:xfrm>
+          <a:prstGeom prst="rect">
+            <a:avLst/>
+          </a:prstGeom>
+          <a:noFill/>
+        </p:spPr>
+        <p:txBody>
+          <a:bodyPr wrap="none" rtlCol="0">
+            <a:spAutoFit/>
+          </a:bodyPr>
+          <a:lstStyle/>
+          <a:p>
+            <a:r>
+              <a:rPr lang="en-US" sz="1500" smtClean="0"/>
+              <a:t>&lt;business entity class&gt;</a:t>
+            </a:r>
+            <a:endParaRPr lang="en-US" sz="1500"/>
+          </a:p>
+        </p:txBody>
+      </p:sp>
+      <p:sp>
+        <p:nvSpPr>
+          <p:cNvPr id="16" name="Rectangle 15"/>
+          <p:cNvSpPr/>
+          <p:nvPr/>
+        </p:nvSpPr>
+        <p:spPr>
+          <a:xfrm>
+            <a:off x="0" y="3680203"/>
+            <a:ext cx="3124200" cy="373607"/>
+          </a:xfrm>
+          <a:prstGeom prst="rect">
+            <a:avLst/>
+          </a:prstGeom>
+          <a:noFill/>
+          <a:ln>
+            <a:solidFill>
+              <a:srgbClr val="FF0000"/>
+            </a:solidFill>
+            <a:prstDash val="lgDash"/>
+          </a:ln>
+        </p:spPr>
+        <p:style>
+          <a:lnRef idx="2">
+            <a:schemeClr val="accent1">
+              <a:shade val="50000"/>
+            </a:schemeClr>
+          </a:lnRef>
+          <a:fillRef idx="1">
+            <a:schemeClr val="accent1"/>
+          </a:fillRef>
+          <a:effectRef idx="0">
+            <a:schemeClr val="accent1"/>
+          </a:effectRef>
+          <a:fontRef idx="minor">
+            <a:schemeClr val="lt1"/>
+          </a:fontRef>
+        </p:style>
+        <p:txBody>
+          <a:bodyPr rtlCol="0" anchor="ctr"/>
+          <a:lstStyle/>
+          <a:p>
+            <a:pPr algn="ctr"/>
+            <a:endParaRPr lang="en-US"/>
+          </a:p>
+        </p:txBody>
+      </p:sp>
+      <p:sp>
+        <p:nvSpPr>
+          <p:cNvPr id="21" name="Rectangle 20"/>
+          <p:cNvSpPr/>
+          <p:nvPr/>
+        </p:nvSpPr>
+        <p:spPr>
+          <a:xfrm>
+            <a:off x="0" y="4343257"/>
+            <a:ext cx="3124200" cy="373607"/>
+          </a:xfrm>
+          <a:prstGeom prst="rect">
+            <a:avLst/>
+          </a:prstGeom>
+          <a:noFill/>
+          <a:ln>
+            <a:solidFill>
+              <a:srgbClr val="FF0000"/>
+            </a:solidFill>
+            <a:prstDash val="lgDash"/>
+          </a:ln>
+        </p:spPr>
+        <p:style>
+          <a:lnRef idx="2">
+            <a:schemeClr val="accent1">
+              <a:shade val="50000"/>
+            </a:schemeClr>
+          </a:lnRef>
+          <a:fillRef idx="1">
+            <a:schemeClr val="accent1"/>
+          </a:fillRef>
+          <a:effectRef idx="0">
+            <a:schemeClr val="accent1"/>
+          </a:effectRef>
+          <a:fontRef idx="minor">
+            <a:schemeClr val="lt1"/>
+          </a:fontRef>
+        </p:style>
+        <p:txBody>
+          <a:bodyPr rtlCol="0" anchor="ctr"/>
+          <a:lstStyle/>
+          <a:p>
+            <a:pPr algn="ctr"/>
+            <a:endParaRPr lang="en-US"/>
+          </a:p>
+        </p:txBody>
+      </p:sp>
+    </p:spTree>
+    <p:extLst>
+      <p:ext uri="{BB962C8B-B14F-4D97-AF65-F5344CB8AC3E}">
+        <p14:creationId xmlns:p14="http://schemas.microsoft.com/office/powerpoint/2010/main" val="1623391359"/>
+      </p:ext>
+    </p:extLst>
+  </p:cSld>
+  <p:clrMapOvr>
+    <a:masterClrMapping/>
+  </p:clrMapOvr>
+</p:sld>
+</file>
+
 <file path=ppt/slides/slide2.xml><?xml version="1.0" encoding="utf-8"?>
 <p:sld xmlns:a="http://schemas.openxmlformats.org/drawingml/2006/main" xmlns:r="http://schemas.openxmlformats.org/officeDocument/2006/relationships" xmlns:p="http://schemas.openxmlformats.org/presentationml/2006/main">
   <p:cSld>

</xml_diff>

<commit_message>
Update hình 7.2.1 Kiến trúc tổng quan framework
</commit_message>
<xml_diff>
--- a/Documents/Thesis Report Picture.pptx
+++ b/Documents/Thesis Report Picture.pptx
@@ -26,6 +26,7 @@
     <p:sldId id="274" r:id="rId20"/>
     <p:sldId id="275" r:id="rId21"/>
     <p:sldId id="276" r:id="rId22"/>
+    <p:sldId id="277" r:id="rId23"/>
   </p:sldIdLst>
   <p:sldSz cx="9144000" cy="6858000" type="screen4x3"/>
   <p:notesSz cx="6858000" cy="9144000"/>
@@ -5834,7 +5835,7 @@
           <a:p>
             <a:fld id="{AEBC359E-74D2-4BE3-B89B-803EEEC24772}" type="datetimeFigureOut">
               <a:rPr lang="en-US" smtClean="0"/>
-              <a:t>12/19/2011</a:t>
+              <a:t>12/21/2011</a:t>
             </a:fld>
             <a:endParaRPr lang="en-US"/>
           </a:p>
@@ -6004,7 +6005,7 @@
           <a:p>
             <a:fld id="{AEBC359E-74D2-4BE3-B89B-803EEEC24772}" type="datetimeFigureOut">
               <a:rPr lang="en-US" smtClean="0"/>
-              <a:t>12/19/2011</a:t>
+              <a:t>12/21/2011</a:t>
             </a:fld>
             <a:endParaRPr lang="en-US"/>
           </a:p>
@@ -6184,7 +6185,7 @@
           <a:p>
             <a:fld id="{AEBC359E-74D2-4BE3-B89B-803EEEC24772}" type="datetimeFigureOut">
               <a:rPr lang="en-US" smtClean="0"/>
-              <a:t>12/19/2011</a:t>
+              <a:t>12/21/2011</a:t>
             </a:fld>
             <a:endParaRPr lang="en-US"/>
           </a:p>
@@ -6354,7 +6355,7 @@
           <a:p>
             <a:fld id="{AEBC359E-74D2-4BE3-B89B-803EEEC24772}" type="datetimeFigureOut">
               <a:rPr lang="en-US" smtClean="0"/>
-              <a:t>12/19/2011</a:t>
+              <a:t>12/21/2011</a:t>
             </a:fld>
             <a:endParaRPr lang="en-US"/>
           </a:p>
@@ -6600,7 +6601,7 @@
           <a:p>
             <a:fld id="{AEBC359E-74D2-4BE3-B89B-803EEEC24772}" type="datetimeFigureOut">
               <a:rPr lang="en-US" smtClean="0"/>
-              <a:t>12/19/2011</a:t>
+              <a:t>12/21/2011</a:t>
             </a:fld>
             <a:endParaRPr lang="en-US"/>
           </a:p>
@@ -6888,7 +6889,7 @@
           <a:p>
             <a:fld id="{AEBC359E-74D2-4BE3-B89B-803EEEC24772}" type="datetimeFigureOut">
               <a:rPr lang="en-US" smtClean="0"/>
-              <a:t>12/19/2011</a:t>
+              <a:t>12/21/2011</a:t>
             </a:fld>
             <a:endParaRPr lang="en-US"/>
           </a:p>
@@ -7310,7 +7311,7 @@
           <a:p>
             <a:fld id="{AEBC359E-74D2-4BE3-B89B-803EEEC24772}" type="datetimeFigureOut">
               <a:rPr lang="en-US" smtClean="0"/>
-              <a:t>12/19/2011</a:t>
+              <a:t>12/21/2011</a:t>
             </a:fld>
             <a:endParaRPr lang="en-US"/>
           </a:p>
@@ -7428,7 +7429,7 @@
           <a:p>
             <a:fld id="{AEBC359E-74D2-4BE3-B89B-803EEEC24772}" type="datetimeFigureOut">
               <a:rPr lang="en-US" smtClean="0"/>
-              <a:t>12/19/2011</a:t>
+              <a:t>12/21/2011</a:t>
             </a:fld>
             <a:endParaRPr lang="en-US"/>
           </a:p>
@@ -7523,7 +7524,7 @@
           <a:p>
             <a:fld id="{AEBC359E-74D2-4BE3-B89B-803EEEC24772}" type="datetimeFigureOut">
               <a:rPr lang="en-US" smtClean="0"/>
-              <a:t>12/19/2011</a:t>
+              <a:t>12/21/2011</a:t>
             </a:fld>
             <a:endParaRPr lang="en-US"/>
           </a:p>
@@ -7800,7 +7801,7 @@
           <a:p>
             <a:fld id="{AEBC359E-74D2-4BE3-B89B-803EEEC24772}" type="datetimeFigureOut">
               <a:rPr lang="en-US" smtClean="0"/>
-              <a:t>12/19/2011</a:t>
+              <a:t>12/21/2011</a:t>
             </a:fld>
             <a:endParaRPr lang="en-US"/>
           </a:p>
@@ -8053,7 +8054,7 @@
           <a:p>
             <a:fld id="{AEBC359E-74D2-4BE3-B89B-803EEEC24772}" type="datetimeFigureOut">
               <a:rPr lang="en-US" smtClean="0"/>
-              <a:t>12/19/2011</a:t>
+              <a:t>12/21/2011</a:t>
             </a:fld>
             <a:endParaRPr lang="en-US"/>
           </a:p>
@@ -8266,7 +8267,7 @@
           <a:p>
             <a:fld id="{AEBC359E-74D2-4BE3-B89B-803EEEC24772}" type="datetimeFigureOut">
               <a:rPr lang="en-US" smtClean="0"/>
-              <a:t>12/19/2011</a:t>
+              <a:t>12/21/2011</a:t>
             </a:fld>
             <a:endParaRPr lang="en-US"/>
           </a:p>
@@ -19138,6 +19139,799 @@
 </p:sld>
 </file>
 
+<file path=ppt/slides/slide22.xml><?xml version="1.0" encoding="utf-8"?>
+<p:sld xmlns:a="http://schemas.openxmlformats.org/drawingml/2006/main" xmlns:r="http://schemas.openxmlformats.org/officeDocument/2006/relationships" xmlns:p="http://schemas.openxmlformats.org/presentationml/2006/main">
+  <p:cSld>
+    <p:spTree>
+      <p:nvGrpSpPr>
+        <p:cNvPr id="1" name=""/>
+        <p:cNvGrpSpPr/>
+        <p:nvPr/>
+      </p:nvGrpSpPr>
+      <p:grpSpPr>
+        <a:xfrm>
+          <a:off x="0" y="0"/>
+          <a:ext cx="0" cy="0"/>
+          <a:chOff x="0" y="0"/>
+          <a:chExt cx="0" cy="0"/>
+        </a:xfrm>
+      </p:grpSpPr>
+      <p:sp>
+        <p:nvSpPr>
+          <p:cNvPr id="4" name="Rounded Rectangle 3"/>
+          <p:cNvSpPr/>
+          <p:nvPr/>
+        </p:nvSpPr>
+        <p:spPr>
+          <a:xfrm>
+            <a:off x="7475561" y="2514600"/>
+            <a:ext cx="1363639" cy="1828800"/>
+          </a:xfrm>
+          <a:prstGeom prst="roundRect">
+            <a:avLst/>
+          </a:prstGeom>
+        </p:spPr>
+        <p:style>
+          <a:lnRef idx="3">
+            <a:schemeClr val="lt1"/>
+          </a:lnRef>
+          <a:fillRef idx="1">
+            <a:schemeClr val="accent3"/>
+          </a:fillRef>
+          <a:effectRef idx="1">
+            <a:schemeClr val="accent3"/>
+          </a:effectRef>
+          <a:fontRef idx="minor">
+            <a:schemeClr val="lt1"/>
+          </a:fontRef>
+        </p:style>
+        <p:txBody>
+          <a:bodyPr rtlCol="0" anchor="ctr"/>
+          <a:lstStyle/>
+          <a:p>
+            <a:pPr algn="ctr"/>
+            <a:r>
+              <a:rPr lang="en-US" smtClean="0"/>
+              <a:t>JobZoom framework</a:t>
+            </a:r>
+          </a:p>
+          <a:p>
+            <a:pPr algn="ctr"/>
+            <a:r>
+              <a:rPr lang="en-US" smtClean="0"/>
+              <a:t>API</a:t>
+            </a:r>
+            <a:endParaRPr lang="en-US"/>
+          </a:p>
+        </p:txBody>
+      </p:sp>
+      <p:pic>
+        <p:nvPicPr>
+          <p:cNvPr id="5" name="Picture 4"/>
+          <p:cNvPicPr>
+            <a:picLocks noChangeAspect="1"/>
+          </p:cNvPicPr>
+          <p:nvPr/>
+        </p:nvPicPr>
+        <p:blipFill>
+          <a:blip r:embed="rId2" cstate="print">
+            <a:extLst>
+              <a:ext uri="{28A0092B-C50C-407E-A947-70E740481C1C}">
+                <a14:useLocalDpi xmlns:a14="http://schemas.microsoft.com/office/drawing/2010/main" val="0"/>
+              </a:ext>
+            </a:extLst>
+          </a:blip>
+          <a:stretch>
+            <a:fillRect/>
+          </a:stretch>
+        </p:blipFill>
+        <p:spPr>
+          <a:xfrm>
+            <a:off x="5440680" y="3063240"/>
+            <a:ext cx="731520" cy="731520"/>
+          </a:xfrm>
+          <a:prstGeom prst="rect">
+            <a:avLst/>
+          </a:prstGeom>
+        </p:spPr>
+      </p:pic>
+      <p:cxnSp>
+        <p:nvCxnSpPr>
+          <p:cNvPr id="7" name="Straight Arrow Connector 6"/>
+          <p:cNvCxnSpPr>
+            <a:stCxn id="5" idx="3"/>
+            <a:endCxn id="4" idx="1"/>
+          </p:cNvCxnSpPr>
+          <p:nvPr/>
+        </p:nvCxnSpPr>
+        <p:spPr>
+          <a:xfrm>
+            <a:off x="6172200" y="3429000"/>
+            <a:ext cx="1303361" cy="0"/>
+          </a:xfrm>
+          <a:prstGeom prst="straightConnector1">
+            <a:avLst/>
+          </a:prstGeom>
+          <a:ln w="12700">
+            <a:tailEnd type="arrow"/>
+          </a:ln>
+        </p:spPr>
+        <p:style>
+          <a:lnRef idx="1">
+            <a:schemeClr val="accent1"/>
+          </a:lnRef>
+          <a:fillRef idx="0">
+            <a:schemeClr val="accent1"/>
+          </a:fillRef>
+          <a:effectRef idx="0">
+            <a:schemeClr val="accent1"/>
+          </a:effectRef>
+          <a:fontRef idx="minor">
+            <a:schemeClr val="tx1"/>
+          </a:fontRef>
+        </p:style>
+      </p:cxnSp>
+      <p:sp>
+        <p:nvSpPr>
+          <p:cNvPr id="8" name="TextBox 7"/>
+          <p:cNvSpPr txBox="1"/>
+          <p:nvPr/>
+        </p:nvSpPr>
+        <p:spPr>
+          <a:xfrm>
+            <a:off x="5867400" y="2514600"/>
+            <a:ext cx="1450203" cy="923330"/>
+          </a:xfrm>
+          <a:prstGeom prst="rect">
+            <a:avLst/>
+          </a:prstGeom>
+          <a:noFill/>
+        </p:spPr>
+        <p:txBody>
+          <a:bodyPr wrap="square" rtlCol="0">
+            <a:spAutoFit/>
+          </a:bodyPr>
+          <a:lstStyle/>
+          <a:p>
+            <a:pPr algn="ctr"/>
+            <a:r>
+              <a:rPr lang="en-US" smtClean="0"/>
+              <a:t>Use library to Implement website</a:t>
+            </a:r>
+            <a:endParaRPr lang="en-US"/>
+          </a:p>
+        </p:txBody>
+      </p:sp>
+      <p:pic>
+        <p:nvPicPr>
+          <p:cNvPr id="10" name="Picture 9"/>
+          <p:cNvPicPr>
+            <a:picLocks noChangeAspect="1"/>
+          </p:cNvPicPr>
+          <p:nvPr/>
+        </p:nvPicPr>
+        <p:blipFill>
+          <a:blip r:embed="rId3" cstate="print">
+            <a:extLst>
+              <a:ext uri="{28A0092B-C50C-407E-A947-70E740481C1C}">
+                <a14:useLocalDpi xmlns:a14="http://schemas.microsoft.com/office/drawing/2010/main" val="0"/>
+              </a:ext>
+            </a:extLst>
+          </a:blip>
+          <a:stretch>
+            <a:fillRect/>
+          </a:stretch>
+        </p:blipFill>
+        <p:spPr>
+          <a:xfrm>
+            <a:off x="3505200" y="2921356"/>
+            <a:ext cx="1752600" cy="1211580"/>
+          </a:xfrm>
+          <a:prstGeom prst="rect">
+            <a:avLst/>
+          </a:prstGeom>
+        </p:spPr>
+      </p:pic>
+      <p:sp>
+        <p:nvSpPr>
+          <p:cNvPr id="11" name="TextBox 10"/>
+          <p:cNvSpPr txBox="1"/>
+          <p:nvPr/>
+        </p:nvSpPr>
+        <p:spPr>
+          <a:xfrm>
+            <a:off x="3762551" y="2267922"/>
+            <a:ext cx="1399999" cy="646331"/>
+          </a:xfrm>
+          <a:prstGeom prst="rect">
+            <a:avLst/>
+          </a:prstGeom>
+          <a:noFill/>
+        </p:spPr>
+        <p:txBody>
+          <a:bodyPr wrap="none" rtlCol="0">
+            <a:spAutoFit/>
+          </a:bodyPr>
+          <a:lstStyle/>
+          <a:p>
+            <a:r>
+              <a:rPr lang="en-US" smtClean="0"/>
+              <a:t>Recruitment </a:t>
+            </a:r>
+          </a:p>
+          <a:p>
+            <a:pPr algn="ctr"/>
+            <a:r>
+              <a:rPr lang="en-US" smtClean="0"/>
+              <a:t>website</a:t>
+            </a:r>
+            <a:endParaRPr lang="en-US"/>
+          </a:p>
+        </p:txBody>
+      </p:sp>
+      <p:pic>
+        <p:nvPicPr>
+          <p:cNvPr id="12" name="Picture 11"/>
+          <p:cNvPicPr>
+            <a:picLocks noChangeAspect="1"/>
+          </p:cNvPicPr>
+          <p:nvPr/>
+        </p:nvPicPr>
+        <p:blipFill>
+          <a:blip r:embed="rId4" cstate="print">
+            <a:extLst>
+              <a:ext uri="{28A0092B-C50C-407E-A947-70E740481C1C}">
+                <a14:useLocalDpi xmlns:a14="http://schemas.microsoft.com/office/drawing/2010/main" val="0"/>
+              </a:ext>
+            </a:extLst>
+          </a:blip>
+          <a:stretch>
+            <a:fillRect/>
+          </a:stretch>
+        </p:blipFill>
+        <p:spPr>
+          <a:xfrm>
+            <a:off x="1901190" y="4325322"/>
+            <a:ext cx="975360" cy="975360"/>
+          </a:xfrm>
+          <a:prstGeom prst="rect">
+            <a:avLst/>
+          </a:prstGeom>
+        </p:spPr>
+      </p:pic>
+      <p:pic>
+        <p:nvPicPr>
+          <p:cNvPr id="13" name="Picture 12"/>
+          <p:cNvPicPr>
+            <a:picLocks noChangeAspect="1"/>
+          </p:cNvPicPr>
+          <p:nvPr/>
+        </p:nvPicPr>
+        <p:blipFill>
+          <a:blip r:embed="rId5" cstate="print">
+            <a:extLst>
+              <a:ext uri="{28A0092B-C50C-407E-A947-70E740481C1C}">
+                <a14:useLocalDpi xmlns:a14="http://schemas.microsoft.com/office/drawing/2010/main" val="0"/>
+              </a:ext>
+            </a:extLst>
+          </a:blip>
+          <a:stretch>
+            <a:fillRect/>
+          </a:stretch>
+        </p:blipFill>
+        <p:spPr>
+          <a:xfrm>
+            <a:off x="1885950" y="1521162"/>
+            <a:ext cx="975360" cy="975360"/>
+          </a:xfrm>
+          <a:prstGeom prst="rect">
+            <a:avLst/>
+          </a:prstGeom>
+        </p:spPr>
+      </p:pic>
+      <p:cxnSp>
+        <p:nvCxnSpPr>
+          <p:cNvPr id="17" name="Curved Connector 16"/>
+          <p:cNvCxnSpPr>
+            <a:stCxn id="13" idx="3"/>
+          </p:cNvCxnSpPr>
+          <p:nvPr/>
+        </p:nvCxnSpPr>
+        <p:spPr>
+          <a:xfrm>
+            <a:off x="2861310" y="2008842"/>
+            <a:ext cx="796290" cy="875377"/>
+          </a:xfrm>
+          <a:prstGeom prst="curvedConnector2">
+            <a:avLst/>
+          </a:prstGeom>
+          <a:ln>
+            <a:tailEnd type="arrow"/>
+          </a:ln>
+        </p:spPr>
+        <p:style>
+          <a:lnRef idx="1">
+            <a:schemeClr val="accent1"/>
+          </a:lnRef>
+          <a:fillRef idx="0">
+            <a:schemeClr val="accent1"/>
+          </a:fillRef>
+          <a:effectRef idx="0">
+            <a:schemeClr val="accent1"/>
+          </a:effectRef>
+          <a:fontRef idx="minor">
+            <a:schemeClr val="tx1"/>
+          </a:fontRef>
+        </p:style>
+      </p:cxnSp>
+      <p:cxnSp>
+        <p:nvCxnSpPr>
+          <p:cNvPr id="19" name="Curved Connector 18"/>
+          <p:cNvCxnSpPr>
+            <a:stCxn id="12" idx="3"/>
+          </p:cNvCxnSpPr>
+          <p:nvPr/>
+        </p:nvCxnSpPr>
+        <p:spPr>
+          <a:xfrm flipV="1">
+            <a:off x="2876550" y="4005282"/>
+            <a:ext cx="1143000" cy="807720"/>
+          </a:xfrm>
+          <a:prstGeom prst="curvedConnector3">
+            <a:avLst/>
+          </a:prstGeom>
+          <a:ln>
+            <a:tailEnd type="arrow"/>
+          </a:ln>
+        </p:spPr>
+        <p:style>
+          <a:lnRef idx="1">
+            <a:schemeClr val="accent1"/>
+          </a:lnRef>
+          <a:fillRef idx="0">
+            <a:schemeClr val="accent1"/>
+          </a:fillRef>
+          <a:effectRef idx="0">
+            <a:schemeClr val="accent1"/>
+          </a:effectRef>
+          <a:fontRef idx="minor">
+            <a:schemeClr val="tx1"/>
+          </a:fontRef>
+        </p:style>
+      </p:cxnSp>
+      <p:sp>
+        <p:nvSpPr>
+          <p:cNvPr id="23" name="Rounded Rectangle 22"/>
+          <p:cNvSpPr/>
+          <p:nvPr/>
+        </p:nvSpPr>
+        <p:spPr>
+          <a:xfrm>
+            <a:off x="8915400" y="2682240"/>
+            <a:ext cx="1447800" cy="762000"/>
+          </a:xfrm>
+          <a:prstGeom prst="roundRect">
+            <a:avLst/>
+          </a:prstGeom>
+        </p:spPr>
+        <p:style>
+          <a:lnRef idx="2">
+            <a:schemeClr val="accent1">
+              <a:shade val="50000"/>
+            </a:schemeClr>
+          </a:lnRef>
+          <a:fillRef idx="1">
+            <a:schemeClr val="accent1"/>
+          </a:fillRef>
+          <a:effectRef idx="0">
+            <a:schemeClr val="accent1"/>
+          </a:effectRef>
+          <a:fontRef idx="minor">
+            <a:schemeClr val="lt1"/>
+          </a:fontRef>
+        </p:style>
+        <p:txBody>
+          <a:bodyPr rtlCol="0" anchor="ctr"/>
+          <a:lstStyle/>
+          <a:p>
+            <a:pPr algn="ctr"/>
+            <a:r>
+              <a:rPr lang="en-US" sz="1500" smtClean="0"/>
+              <a:t>Decision tree &lt;component&gt;</a:t>
+            </a:r>
+            <a:endParaRPr lang="en-US" sz="1500"/>
+          </a:p>
+        </p:txBody>
+      </p:sp>
+      <p:sp>
+        <p:nvSpPr>
+          <p:cNvPr id="24" name="Rounded Rectangle 23"/>
+          <p:cNvSpPr/>
+          <p:nvPr/>
+        </p:nvSpPr>
+        <p:spPr>
+          <a:xfrm>
+            <a:off x="8925636" y="3657600"/>
+            <a:ext cx="1447800" cy="762000"/>
+          </a:xfrm>
+          <a:prstGeom prst="roundRect">
+            <a:avLst/>
+          </a:prstGeom>
+        </p:spPr>
+        <p:style>
+          <a:lnRef idx="2">
+            <a:schemeClr val="accent1">
+              <a:shade val="50000"/>
+            </a:schemeClr>
+          </a:lnRef>
+          <a:fillRef idx="1">
+            <a:schemeClr val="accent1"/>
+          </a:fillRef>
+          <a:effectRef idx="0">
+            <a:schemeClr val="accent1"/>
+          </a:effectRef>
+          <a:fontRef idx="minor">
+            <a:schemeClr val="lt1"/>
+          </a:fontRef>
+        </p:style>
+        <p:txBody>
+          <a:bodyPr rtlCol="0" anchor="ctr"/>
+          <a:lstStyle/>
+          <a:p>
+            <a:pPr algn="ctr"/>
+            <a:r>
+              <a:rPr lang="en-US" sz="1500" smtClean="0"/>
+              <a:t>taxonomy &lt;component&gt;</a:t>
+            </a:r>
+            <a:endParaRPr lang="en-US" sz="1500"/>
+          </a:p>
+        </p:txBody>
+      </p:sp>
+      <p:sp>
+        <p:nvSpPr>
+          <p:cNvPr id="25" name="Rounded Rectangle 24"/>
+          <p:cNvSpPr/>
+          <p:nvPr/>
+        </p:nvSpPr>
+        <p:spPr>
+          <a:xfrm>
+            <a:off x="8915400" y="1778069"/>
+            <a:ext cx="1447800" cy="762000"/>
+          </a:xfrm>
+          <a:prstGeom prst="roundRect">
+            <a:avLst/>
+          </a:prstGeom>
+        </p:spPr>
+        <p:style>
+          <a:lnRef idx="2">
+            <a:schemeClr val="accent1">
+              <a:shade val="50000"/>
+            </a:schemeClr>
+          </a:lnRef>
+          <a:fillRef idx="1">
+            <a:schemeClr val="accent1"/>
+          </a:fillRef>
+          <a:effectRef idx="0">
+            <a:schemeClr val="accent1"/>
+          </a:effectRef>
+          <a:fontRef idx="minor">
+            <a:schemeClr val="lt1"/>
+          </a:fontRef>
+        </p:style>
+        <p:txBody>
+          <a:bodyPr rtlCol="0" anchor="ctr"/>
+          <a:lstStyle/>
+          <a:p>
+            <a:pPr algn="ctr"/>
+            <a:r>
+              <a:rPr lang="en-US" sz="1500" smtClean="0"/>
+              <a:t>Flexiblity attribute &lt;component&gt;</a:t>
+            </a:r>
+            <a:endParaRPr lang="en-US" sz="1500"/>
+          </a:p>
+        </p:txBody>
+      </p:sp>
+      <p:sp>
+        <p:nvSpPr>
+          <p:cNvPr id="27" name="Rounded Rectangle 26"/>
+          <p:cNvSpPr/>
+          <p:nvPr/>
+        </p:nvSpPr>
+        <p:spPr>
+          <a:xfrm>
+            <a:off x="8925636" y="4603845"/>
+            <a:ext cx="1447800" cy="762000"/>
+          </a:xfrm>
+          <a:prstGeom prst="roundRect">
+            <a:avLst/>
+          </a:prstGeom>
+        </p:spPr>
+        <p:style>
+          <a:lnRef idx="2">
+            <a:schemeClr val="accent1">
+              <a:shade val="50000"/>
+            </a:schemeClr>
+          </a:lnRef>
+          <a:fillRef idx="1">
+            <a:schemeClr val="accent1"/>
+          </a:fillRef>
+          <a:effectRef idx="0">
+            <a:schemeClr val="accent1"/>
+          </a:effectRef>
+          <a:fontRef idx="minor">
+            <a:schemeClr val="lt1"/>
+          </a:fontRef>
+        </p:style>
+        <p:txBody>
+          <a:bodyPr rtlCol="0" anchor="ctr"/>
+          <a:lstStyle/>
+          <a:p>
+            <a:pPr algn="ctr"/>
+            <a:r>
+              <a:rPr lang="en-US" sz="1500" smtClean="0"/>
+              <a:t>others &lt;component&gt;</a:t>
+            </a:r>
+            <a:endParaRPr lang="en-US" sz="1500"/>
+          </a:p>
+        </p:txBody>
+      </p:sp>
+      <p:sp>
+        <p:nvSpPr>
+          <p:cNvPr id="28" name="Rounded Rectangle 27"/>
+          <p:cNvSpPr/>
+          <p:nvPr/>
+        </p:nvSpPr>
+        <p:spPr>
+          <a:xfrm>
+            <a:off x="7315200" y="1523999"/>
+            <a:ext cx="3276600" cy="3962401"/>
+          </a:xfrm>
+          <a:prstGeom prst="roundRect">
+            <a:avLst/>
+          </a:prstGeom>
+          <a:noFill/>
+          <a:ln w="28575">
+            <a:prstDash val="solid"/>
+          </a:ln>
+        </p:spPr>
+        <p:style>
+          <a:lnRef idx="2">
+            <a:schemeClr val="accent1">
+              <a:shade val="50000"/>
+            </a:schemeClr>
+          </a:lnRef>
+          <a:fillRef idx="1">
+            <a:schemeClr val="accent1"/>
+          </a:fillRef>
+          <a:effectRef idx="0">
+            <a:schemeClr val="accent1"/>
+          </a:effectRef>
+          <a:fontRef idx="minor">
+            <a:schemeClr val="lt1"/>
+          </a:fontRef>
+        </p:style>
+        <p:txBody>
+          <a:bodyPr rtlCol="0" anchor="b"/>
+          <a:lstStyle/>
+          <a:p>
+            <a:pPr algn="ctr"/>
+            <a:endParaRPr lang="en-US">
+              <a:solidFill>
+                <a:srgbClr val="FF0000"/>
+              </a:solidFill>
+            </a:endParaRPr>
+          </a:p>
+        </p:txBody>
+      </p:sp>
+      <p:sp>
+        <p:nvSpPr>
+          <p:cNvPr id="30" name="TextBox 29"/>
+          <p:cNvSpPr txBox="1"/>
+          <p:nvPr/>
+        </p:nvSpPr>
+        <p:spPr>
+          <a:xfrm>
+            <a:off x="2963250" y="2173357"/>
+            <a:ext cx="522900" cy="323165"/>
+          </a:xfrm>
+          <a:prstGeom prst="rect">
+            <a:avLst/>
+          </a:prstGeom>
+          <a:noFill/>
+        </p:spPr>
+        <p:txBody>
+          <a:bodyPr wrap="none" rtlCol="0">
+            <a:spAutoFit/>
+          </a:bodyPr>
+          <a:lstStyle/>
+          <a:p>
+            <a:r>
+              <a:rPr lang="en-US" sz="1500" smtClean="0"/>
+              <a:t>Use </a:t>
+            </a:r>
+            <a:endParaRPr lang="en-US" sz="1500"/>
+          </a:p>
+        </p:txBody>
+      </p:sp>
+      <p:sp>
+        <p:nvSpPr>
+          <p:cNvPr id="31" name="TextBox 30"/>
+          <p:cNvSpPr txBox="1"/>
+          <p:nvPr/>
+        </p:nvSpPr>
+        <p:spPr>
+          <a:xfrm>
+            <a:off x="3039450" y="4172922"/>
+            <a:ext cx="522900" cy="323165"/>
+          </a:xfrm>
+          <a:prstGeom prst="rect">
+            <a:avLst/>
+          </a:prstGeom>
+          <a:noFill/>
+        </p:spPr>
+        <p:txBody>
+          <a:bodyPr wrap="none" rtlCol="0">
+            <a:spAutoFit/>
+          </a:bodyPr>
+          <a:lstStyle/>
+          <a:p>
+            <a:r>
+              <a:rPr lang="en-US" sz="1500" smtClean="0"/>
+              <a:t>Use </a:t>
+            </a:r>
+            <a:endParaRPr lang="en-US" sz="1500"/>
+          </a:p>
+        </p:txBody>
+      </p:sp>
+      <p:sp>
+        <p:nvSpPr>
+          <p:cNvPr id="32" name="TextBox 31"/>
+          <p:cNvSpPr txBox="1"/>
+          <p:nvPr/>
+        </p:nvSpPr>
+        <p:spPr>
+          <a:xfrm>
+            <a:off x="5314950" y="3896268"/>
+            <a:ext cx="989758" cy="323165"/>
+          </a:xfrm>
+          <a:prstGeom prst="rect">
+            <a:avLst/>
+          </a:prstGeom>
+          <a:noFill/>
+        </p:spPr>
+        <p:txBody>
+          <a:bodyPr wrap="none" rtlCol="0">
+            <a:spAutoFit/>
+          </a:bodyPr>
+          <a:lstStyle/>
+          <a:p>
+            <a:r>
+              <a:rPr lang="en-US" sz="1500"/>
+              <a:t>D</a:t>
+            </a:r>
+            <a:r>
+              <a:rPr lang="en-US" sz="1500" smtClean="0"/>
+              <a:t>eveloper</a:t>
+            </a:r>
+            <a:endParaRPr lang="en-US" sz="1500"/>
+          </a:p>
+        </p:txBody>
+      </p:sp>
+      <p:sp>
+        <p:nvSpPr>
+          <p:cNvPr id="33" name="TextBox 32"/>
+          <p:cNvSpPr txBox="1"/>
+          <p:nvPr/>
+        </p:nvSpPr>
+        <p:spPr>
+          <a:xfrm>
+            <a:off x="1925538" y="5315635"/>
+            <a:ext cx="926664" cy="323165"/>
+          </a:xfrm>
+          <a:prstGeom prst="rect">
+            <a:avLst/>
+          </a:prstGeom>
+          <a:noFill/>
+        </p:spPr>
+        <p:txBody>
+          <a:bodyPr wrap="none" rtlCol="0">
+            <a:spAutoFit/>
+          </a:bodyPr>
+          <a:lstStyle/>
+          <a:p>
+            <a:r>
+              <a:rPr lang="en-US" sz="1500" smtClean="0"/>
+              <a:t>Employer</a:t>
+            </a:r>
+            <a:endParaRPr lang="en-US" sz="1500"/>
+          </a:p>
+        </p:txBody>
+      </p:sp>
+      <p:sp>
+        <p:nvSpPr>
+          <p:cNvPr id="34" name="TextBox 33"/>
+          <p:cNvSpPr txBox="1"/>
+          <p:nvPr/>
+        </p:nvSpPr>
+        <p:spPr>
+          <a:xfrm>
+            <a:off x="1872557" y="2494297"/>
+            <a:ext cx="1003993" cy="323165"/>
+          </a:xfrm>
+          <a:prstGeom prst="rect">
+            <a:avLst/>
+          </a:prstGeom>
+          <a:noFill/>
+        </p:spPr>
+        <p:txBody>
+          <a:bodyPr wrap="none" rtlCol="0">
+            <a:spAutoFit/>
+          </a:bodyPr>
+          <a:lstStyle/>
+          <a:p>
+            <a:r>
+              <a:rPr lang="en-US" sz="1500" smtClean="0"/>
+              <a:t>Job seeker</a:t>
+            </a:r>
+            <a:endParaRPr lang="en-US" sz="1500"/>
+          </a:p>
+        </p:txBody>
+      </p:sp>
+      <p:sp>
+        <p:nvSpPr>
+          <p:cNvPr id="39" name="TextBox 38"/>
+          <p:cNvSpPr txBox="1"/>
+          <p:nvPr/>
+        </p:nvSpPr>
+        <p:spPr>
+          <a:xfrm>
+            <a:off x="7086600" y="5449669"/>
+            <a:ext cx="3695755" cy="646331"/>
+          </a:xfrm>
+          <a:prstGeom prst="rect">
+            <a:avLst/>
+          </a:prstGeom>
+          <a:noFill/>
+        </p:spPr>
+        <p:txBody>
+          <a:bodyPr wrap="none" rtlCol="0">
+            <a:spAutoFit/>
+          </a:bodyPr>
+          <a:lstStyle/>
+          <a:p>
+            <a:pPr algn="ctr"/>
+            <a:r>
+              <a:rPr lang="en-US" b="1" smtClean="0">
+                <a:solidFill>
+                  <a:srgbClr val="FF0000"/>
+                </a:solidFill>
+              </a:rPr>
+              <a:t>JobZoom framework architecture</a:t>
+            </a:r>
+          </a:p>
+          <a:p>
+            <a:pPr algn="ctr"/>
+            <a:r>
+              <a:rPr lang="en-US" smtClean="0"/>
+              <a:t>{components, connectors, constraint}</a:t>
+            </a:r>
+            <a:endParaRPr lang="en-US"/>
+          </a:p>
+        </p:txBody>
+      </p:sp>
+    </p:spTree>
+    <p:extLst>
+      <p:ext uri="{BB962C8B-B14F-4D97-AF65-F5344CB8AC3E}">
+        <p14:creationId xmlns:p14="http://schemas.microsoft.com/office/powerpoint/2010/main" val="796176087"/>
+      </p:ext>
+    </p:extLst>
+  </p:cSld>
+  <p:clrMapOvr>
+    <a:masterClrMapping/>
+  </p:clrMapOvr>
+</p:sld>
+</file>
+
 <file path=ppt/slides/slide3.xml><?xml version="1.0" encoding="utf-8"?>
 <p:sld xmlns:a="http://schemas.openxmlformats.org/drawingml/2006/main" xmlns:r="http://schemas.openxmlformats.org/officeDocument/2006/relationships" xmlns:p="http://schemas.openxmlformats.org/presentationml/2006/main">
   <p:cSld>

</xml_diff>

<commit_message>
Mới sửa hình 7.2.1.3	Development View - kiến trúc phần mềm dưới góc độ lập trình viên
</commit_message>
<xml_diff>
--- a/Documents/Thesis Report Picture.pptx
+++ b/Documents/Thesis Report Picture.pptx
@@ -27,6 +27,7 @@
     <p:sldId id="275" r:id="rId21"/>
     <p:sldId id="276" r:id="rId22"/>
     <p:sldId id="277" r:id="rId23"/>
+    <p:sldId id="278" r:id="rId24"/>
   </p:sldIdLst>
   <p:sldSz cx="9144000" cy="6858000" type="screen4x3"/>
   <p:notesSz cx="6858000" cy="9144000"/>
@@ -5835,7 +5836,7 @@
           <a:p>
             <a:fld id="{AEBC359E-74D2-4BE3-B89B-803EEEC24772}" type="datetimeFigureOut">
               <a:rPr lang="en-US" smtClean="0"/>
-              <a:t>12/21/2011</a:t>
+              <a:t>12/23/2011</a:t>
             </a:fld>
             <a:endParaRPr lang="en-US"/>
           </a:p>
@@ -6005,7 +6006,7 @@
           <a:p>
             <a:fld id="{AEBC359E-74D2-4BE3-B89B-803EEEC24772}" type="datetimeFigureOut">
               <a:rPr lang="en-US" smtClean="0"/>
-              <a:t>12/21/2011</a:t>
+              <a:t>12/23/2011</a:t>
             </a:fld>
             <a:endParaRPr lang="en-US"/>
           </a:p>
@@ -6185,7 +6186,7 @@
           <a:p>
             <a:fld id="{AEBC359E-74D2-4BE3-B89B-803EEEC24772}" type="datetimeFigureOut">
               <a:rPr lang="en-US" smtClean="0"/>
-              <a:t>12/21/2011</a:t>
+              <a:t>12/23/2011</a:t>
             </a:fld>
             <a:endParaRPr lang="en-US"/>
           </a:p>
@@ -6355,7 +6356,7 @@
           <a:p>
             <a:fld id="{AEBC359E-74D2-4BE3-B89B-803EEEC24772}" type="datetimeFigureOut">
               <a:rPr lang="en-US" smtClean="0"/>
-              <a:t>12/21/2011</a:t>
+              <a:t>12/23/2011</a:t>
             </a:fld>
             <a:endParaRPr lang="en-US"/>
           </a:p>
@@ -6601,7 +6602,7 @@
           <a:p>
             <a:fld id="{AEBC359E-74D2-4BE3-B89B-803EEEC24772}" type="datetimeFigureOut">
               <a:rPr lang="en-US" smtClean="0"/>
-              <a:t>12/21/2011</a:t>
+              <a:t>12/23/2011</a:t>
             </a:fld>
             <a:endParaRPr lang="en-US"/>
           </a:p>
@@ -6889,7 +6890,7 @@
           <a:p>
             <a:fld id="{AEBC359E-74D2-4BE3-B89B-803EEEC24772}" type="datetimeFigureOut">
               <a:rPr lang="en-US" smtClean="0"/>
-              <a:t>12/21/2011</a:t>
+              <a:t>12/23/2011</a:t>
             </a:fld>
             <a:endParaRPr lang="en-US"/>
           </a:p>
@@ -7311,7 +7312,7 @@
           <a:p>
             <a:fld id="{AEBC359E-74D2-4BE3-B89B-803EEEC24772}" type="datetimeFigureOut">
               <a:rPr lang="en-US" smtClean="0"/>
-              <a:t>12/21/2011</a:t>
+              <a:t>12/23/2011</a:t>
             </a:fld>
             <a:endParaRPr lang="en-US"/>
           </a:p>
@@ -7429,7 +7430,7 @@
           <a:p>
             <a:fld id="{AEBC359E-74D2-4BE3-B89B-803EEEC24772}" type="datetimeFigureOut">
               <a:rPr lang="en-US" smtClean="0"/>
-              <a:t>12/21/2011</a:t>
+              <a:t>12/23/2011</a:t>
             </a:fld>
             <a:endParaRPr lang="en-US"/>
           </a:p>
@@ -7524,7 +7525,7 @@
           <a:p>
             <a:fld id="{AEBC359E-74D2-4BE3-B89B-803EEEC24772}" type="datetimeFigureOut">
               <a:rPr lang="en-US" smtClean="0"/>
-              <a:t>12/21/2011</a:t>
+              <a:t>12/23/2011</a:t>
             </a:fld>
             <a:endParaRPr lang="en-US"/>
           </a:p>
@@ -7801,7 +7802,7 @@
           <a:p>
             <a:fld id="{AEBC359E-74D2-4BE3-B89B-803EEEC24772}" type="datetimeFigureOut">
               <a:rPr lang="en-US" smtClean="0"/>
-              <a:t>12/21/2011</a:t>
+              <a:t>12/23/2011</a:t>
             </a:fld>
             <a:endParaRPr lang="en-US"/>
           </a:p>
@@ -8054,7 +8055,7 @@
           <a:p>
             <a:fld id="{AEBC359E-74D2-4BE3-B89B-803EEEC24772}" type="datetimeFigureOut">
               <a:rPr lang="en-US" smtClean="0"/>
-              <a:t>12/21/2011</a:t>
+              <a:t>12/23/2011</a:t>
             </a:fld>
             <a:endParaRPr lang="en-US"/>
           </a:p>
@@ -8267,7 +8268,7 @@
           <a:p>
             <a:fld id="{AEBC359E-74D2-4BE3-B89B-803EEEC24772}" type="datetimeFigureOut">
               <a:rPr lang="en-US" smtClean="0"/>
-              <a:t>12/21/2011</a:t>
+              <a:t>12/23/2011</a:t>
             </a:fld>
             <a:endParaRPr lang="en-US"/>
           </a:p>
@@ -19932,6 +19933,1804 @@
 </p:sld>
 </file>
 
+<file path=ppt/slides/slide23.xml><?xml version="1.0" encoding="utf-8"?>
+<p:sld xmlns:a="http://schemas.openxmlformats.org/drawingml/2006/main" xmlns:r="http://schemas.openxmlformats.org/officeDocument/2006/relationships" xmlns:p="http://schemas.openxmlformats.org/presentationml/2006/main">
+  <p:cSld>
+    <p:spTree>
+      <p:nvGrpSpPr>
+        <p:cNvPr id="1" name=""/>
+        <p:cNvGrpSpPr/>
+        <p:nvPr/>
+      </p:nvGrpSpPr>
+      <p:grpSpPr>
+        <a:xfrm>
+          <a:off x="0" y="0"/>
+          <a:ext cx="0" cy="0"/>
+          <a:chOff x="0" y="0"/>
+          <a:chExt cx="0" cy="0"/>
+        </a:xfrm>
+      </p:grpSpPr>
+      <p:sp>
+        <p:nvSpPr>
+          <p:cNvPr id="4" name="Rounded Rectangle 3"/>
+          <p:cNvSpPr/>
+          <p:nvPr/>
+        </p:nvSpPr>
+        <p:spPr>
+          <a:xfrm>
+            <a:off x="2913413" y="475582"/>
+            <a:ext cx="5163787" cy="6230018"/>
+          </a:xfrm>
+          <a:prstGeom prst="roundRect">
+            <a:avLst>
+              <a:gd name="adj" fmla="val 3874"/>
+            </a:avLst>
+          </a:prstGeom>
+        </p:spPr>
+        <p:style>
+          <a:lnRef idx="1">
+            <a:schemeClr val="accent3"/>
+          </a:lnRef>
+          <a:fillRef idx="2">
+            <a:schemeClr val="accent3"/>
+          </a:fillRef>
+          <a:effectRef idx="1">
+            <a:schemeClr val="accent3"/>
+          </a:effectRef>
+          <a:fontRef idx="minor">
+            <a:schemeClr val="dk1"/>
+          </a:fontRef>
+        </p:style>
+        <p:txBody>
+          <a:bodyPr rtlCol="0" anchor="t"/>
+          <a:lstStyle/>
+          <a:p>
+            <a:pPr algn="ctr"/>
+            <a:r>
+              <a:rPr lang="en-US" dirty="0" smtClean="0"/>
+              <a:t>JOBZOOM FRAMEWORK API</a:t>
+            </a:r>
+            <a:endParaRPr lang="vi-VN" dirty="0"/>
+          </a:p>
+        </p:txBody>
+      </p:sp>
+      <p:sp>
+        <p:nvSpPr>
+          <p:cNvPr id="5" name="Rectangle 4"/>
+          <p:cNvSpPr/>
+          <p:nvPr/>
+        </p:nvSpPr>
+        <p:spPr>
+          <a:xfrm>
+            <a:off x="3485710" y="3946963"/>
+            <a:ext cx="1752600" cy="457200"/>
+          </a:xfrm>
+          <a:prstGeom prst="rect">
+            <a:avLst/>
+          </a:prstGeom>
+        </p:spPr>
+        <p:style>
+          <a:lnRef idx="1">
+            <a:schemeClr val="accent2"/>
+          </a:lnRef>
+          <a:fillRef idx="2">
+            <a:schemeClr val="accent2"/>
+          </a:fillRef>
+          <a:effectRef idx="1">
+            <a:schemeClr val="accent2"/>
+          </a:effectRef>
+          <a:fontRef idx="minor">
+            <a:schemeClr val="dk1"/>
+          </a:fontRef>
+        </p:style>
+        <p:txBody>
+          <a:bodyPr rtlCol="0" anchor="ctr"/>
+          <a:lstStyle/>
+          <a:p>
+            <a:pPr algn="ctr"/>
+            <a:r>
+              <a:rPr lang="en-US" sz="1200" b="1" dirty="0" smtClean="0">
+                <a:solidFill>
+                  <a:schemeClr val="tx2"/>
+                </a:solidFill>
+                <a:latin typeface="Times New Roman" pitchFamily="18" charset="0"/>
+                <a:cs typeface="Times New Roman" pitchFamily="18" charset="0"/>
+              </a:rPr>
+              <a:t>Interface </a:t>
+            </a:r>
+            <a:r>
+              <a:rPr lang="en-US" sz="1200" b="1" noProof="1" smtClean="0">
+                <a:solidFill>
+                  <a:schemeClr val="tx2"/>
+                </a:solidFill>
+                <a:latin typeface="Times New Roman" pitchFamily="18" charset="0"/>
+                <a:cs typeface="Times New Roman" pitchFamily="18" charset="0"/>
+              </a:rPr>
+              <a:t>IAnalysisServices</a:t>
+            </a:r>
+            <a:endParaRPr lang="en-US" sz="1200" b="1" noProof="1">
+              <a:solidFill>
+                <a:schemeClr val="tx2"/>
+              </a:solidFill>
+              <a:latin typeface="Times New Roman" pitchFamily="18" charset="0"/>
+              <a:cs typeface="Times New Roman" pitchFamily="18" charset="0"/>
+            </a:endParaRPr>
+          </a:p>
+        </p:txBody>
+      </p:sp>
+      <p:sp>
+        <p:nvSpPr>
+          <p:cNvPr id="6" name="Rectangle 5"/>
+          <p:cNvSpPr/>
+          <p:nvPr/>
+        </p:nvSpPr>
+        <p:spPr>
+          <a:xfrm>
+            <a:off x="3485710" y="4610509"/>
+            <a:ext cx="1752600" cy="457200"/>
+          </a:xfrm>
+          <a:prstGeom prst="rect">
+            <a:avLst/>
+          </a:prstGeom>
+        </p:spPr>
+        <p:style>
+          <a:lnRef idx="1">
+            <a:schemeClr val="accent2"/>
+          </a:lnRef>
+          <a:fillRef idx="2">
+            <a:schemeClr val="accent2"/>
+          </a:fillRef>
+          <a:effectRef idx="1">
+            <a:schemeClr val="accent2"/>
+          </a:effectRef>
+          <a:fontRef idx="minor">
+            <a:schemeClr val="dk1"/>
+          </a:fontRef>
+        </p:style>
+        <p:txBody>
+          <a:bodyPr rtlCol="0" anchor="ctr"/>
+          <a:lstStyle/>
+          <a:p>
+            <a:pPr algn="ctr"/>
+            <a:r>
+              <a:rPr lang="en-US" sz="1200" b="1" dirty="0" smtClean="0">
+                <a:solidFill>
+                  <a:schemeClr val="tx2"/>
+                </a:solidFill>
+                <a:latin typeface="Times New Roman" pitchFamily="18" charset="0"/>
+                <a:cs typeface="Times New Roman" pitchFamily="18" charset="0"/>
+              </a:rPr>
+              <a:t>Interface</a:t>
+            </a:r>
+          </a:p>
+          <a:p>
+            <a:pPr algn="ctr"/>
+            <a:r>
+              <a:rPr lang="vi-VN" sz="1200" b="1" noProof="1" smtClean="0">
+                <a:solidFill>
+                  <a:schemeClr val="tx2"/>
+                </a:solidFill>
+                <a:latin typeface="Times New Roman" pitchFamily="18" charset="0"/>
+                <a:cs typeface="Times New Roman" pitchFamily="18" charset="0"/>
+              </a:rPr>
+              <a:t>IDecisionTreeStructure</a:t>
+            </a:r>
+            <a:endParaRPr lang="vi-VN" sz="1200" b="1" noProof="1">
+              <a:solidFill>
+                <a:schemeClr val="tx2"/>
+              </a:solidFill>
+              <a:latin typeface="Times New Roman" pitchFamily="18" charset="0"/>
+              <a:cs typeface="Times New Roman" pitchFamily="18" charset="0"/>
+            </a:endParaRPr>
+          </a:p>
+        </p:txBody>
+      </p:sp>
+      <p:sp>
+        <p:nvSpPr>
+          <p:cNvPr id="8" name="TextBox 7"/>
+          <p:cNvSpPr txBox="1"/>
+          <p:nvPr/>
+        </p:nvSpPr>
+        <p:spPr>
+          <a:xfrm>
+            <a:off x="986558" y="4514444"/>
+            <a:ext cx="1151084" cy="369332"/>
+          </a:xfrm>
+          <a:prstGeom prst="rect">
+            <a:avLst/>
+          </a:prstGeom>
+          <a:noFill/>
+        </p:spPr>
+        <p:txBody>
+          <a:bodyPr wrap="none" rtlCol="0">
+            <a:spAutoFit/>
+          </a:bodyPr>
+          <a:lstStyle/>
+          <a:p>
+            <a:pPr algn="ctr"/>
+            <a:r>
+              <a:rPr lang="en-US" dirty="0" smtClean="0"/>
+              <a:t>Developer</a:t>
+            </a:r>
+            <a:endParaRPr lang="en-US" dirty="0"/>
+          </a:p>
+        </p:txBody>
+      </p:sp>
+      <p:sp>
+        <p:nvSpPr>
+          <p:cNvPr id="9" name="Rectangle 8"/>
+          <p:cNvSpPr/>
+          <p:nvPr/>
+        </p:nvSpPr>
+        <p:spPr>
+          <a:xfrm>
+            <a:off x="3473614" y="1681917"/>
+            <a:ext cx="1752600" cy="457200"/>
+          </a:xfrm>
+          <a:prstGeom prst="rect">
+            <a:avLst/>
+          </a:prstGeom>
+        </p:spPr>
+        <p:style>
+          <a:lnRef idx="1">
+            <a:schemeClr val="accent5"/>
+          </a:lnRef>
+          <a:fillRef idx="2">
+            <a:schemeClr val="accent5"/>
+          </a:fillRef>
+          <a:effectRef idx="1">
+            <a:schemeClr val="accent5"/>
+          </a:effectRef>
+          <a:fontRef idx="minor">
+            <a:schemeClr val="dk1"/>
+          </a:fontRef>
+        </p:style>
+        <p:txBody>
+          <a:bodyPr rtlCol="0" anchor="ctr"/>
+          <a:lstStyle/>
+          <a:p>
+            <a:pPr algn="ctr"/>
+            <a:r>
+              <a:rPr lang="en-US" sz="1200" b="1" noProof="1" smtClean="0">
+                <a:solidFill>
+                  <a:schemeClr val="tx2"/>
+                </a:solidFill>
+                <a:latin typeface="Times New Roman" pitchFamily="18" charset="0"/>
+                <a:cs typeface="Times New Roman" pitchFamily="18" charset="0"/>
+              </a:rPr>
+              <a:t>Attribute Mapping Class</a:t>
+            </a:r>
+            <a:endParaRPr lang="vi-VN" sz="1200" b="1" noProof="1">
+              <a:solidFill>
+                <a:schemeClr val="tx2"/>
+              </a:solidFill>
+              <a:latin typeface="Times New Roman" pitchFamily="18" charset="0"/>
+              <a:cs typeface="Times New Roman" pitchFamily="18" charset="0"/>
+            </a:endParaRPr>
+          </a:p>
+        </p:txBody>
+      </p:sp>
+      <p:sp>
+        <p:nvSpPr>
+          <p:cNvPr id="10" name="Rectangle 9"/>
+          <p:cNvSpPr/>
+          <p:nvPr/>
+        </p:nvSpPr>
+        <p:spPr>
+          <a:xfrm>
+            <a:off x="3484114" y="5382868"/>
+            <a:ext cx="1752600" cy="457200"/>
+          </a:xfrm>
+          <a:prstGeom prst="rect">
+            <a:avLst/>
+          </a:prstGeom>
+        </p:spPr>
+        <p:style>
+          <a:lnRef idx="1">
+            <a:schemeClr val="accent2"/>
+          </a:lnRef>
+          <a:fillRef idx="2">
+            <a:schemeClr val="accent2"/>
+          </a:fillRef>
+          <a:effectRef idx="1">
+            <a:schemeClr val="accent2"/>
+          </a:effectRef>
+          <a:fontRef idx="minor">
+            <a:schemeClr val="dk1"/>
+          </a:fontRef>
+        </p:style>
+        <p:txBody>
+          <a:bodyPr rtlCol="0" anchor="ctr"/>
+          <a:lstStyle/>
+          <a:p>
+            <a:pPr algn="ctr"/>
+            <a:r>
+              <a:rPr lang="en-US" sz="1200" b="1" dirty="0" smtClean="0">
+                <a:solidFill>
+                  <a:schemeClr val="tx2"/>
+                </a:solidFill>
+                <a:latin typeface="Times New Roman" pitchFamily="18" charset="0"/>
+                <a:cs typeface="Times New Roman" pitchFamily="18" charset="0"/>
+              </a:rPr>
+              <a:t>Interface</a:t>
+            </a:r>
+          </a:p>
+          <a:p>
+            <a:pPr algn="ctr"/>
+            <a:r>
+              <a:rPr lang="vi-VN" sz="1200" b="1" noProof="1" smtClean="0">
+                <a:solidFill>
+                  <a:schemeClr val="tx2"/>
+                </a:solidFill>
+                <a:latin typeface="Times New Roman" pitchFamily="18" charset="0"/>
+                <a:cs typeface="Times New Roman" pitchFamily="18" charset="0"/>
+              </a:rPr>
+              <a:t>I</a:t>
+            </a:r>
+            <a:r>
+              <a:rPr lang="en-US" sz="1200" b="1" noProof="1" smtClean="0">
+                <a:solidFill>
+                  <a:schemeClr val="tx2"/>
+                </a:solidFill>
+                <a:latin typeface="Times New Roman" pitchFamily="18" charset="0"/>
+                <a:cs typeface="Times New Roman" pitchFamily="18" charset="0"/>
+              </a:rPr>
+              <a:t>SimilarityTerm</a:t>
+            </a:r>
+            <a:endParaRPr lang="vi-VN" sz="1200" b="1" noProof="1">
+              <a:solidFill>
+                <a:schemeClr val="tx2"/>
+              </a:solidFill>
+              <a:latin typeface="Times New Roman" pitchFamily="18" charset="0"/>
+              <a:cs typeface="Times New Roman" pitchFamily="18" charset="0"/>
+            </a:endParaRPr>
+          </a:p>
+        </p:txBody>
+      </p:sp>
+      <p:sp>
+        <p:nvSpPr>
+          <p:cNvPr id="11" name="Rectangle 10"/>
+          <p:cNvSpPr/>
+          <p:nvPr/>
+        </p:nvSpPr>
+        <p:spPr>
+          <a:xfrm>
+            <a:off x="3485710" y="6019375"/>
+            <a:ext cx="1752600" cy="457200"/>
+          </a:xfrm>
+          <a:prstGeom prst="rect">
+            <a:avLst/>
+          </a:prstGeom>
+        </p:spPr>
+        <p:style>
+          <a:lnRef idx="1">
+            <a:schemeClr val="accent2"/>
+          </a:lnRef>
+          <a:fillRef idx="2">
+            <a:schemeClr val="accent2"/>
+          </a:fillRef>
+          <a:effectRef idx="1">
+            <a:schemeClr val="accent2"/>
+          </a:effectRef>
+          <a:fontRef idx="minor">
+            <a:schemeClr val="dk1"/>
+          </a:fontRef>
+        </p:style>
+        <p:txBody>
+          <a:bodyPr rtlCol="0" anchor="ctr"/>
+          <a:lstStyle/>
+          <a:p>
+            <a:pPr algn="ctr"/>
+            <a:r>
+              <a:rPr lang="en-US" sz="1200" b="1" dirty="0" smtClean="0">
+                <a:solidFill>
+                  <a:schemeClr val="tx2"/>
+                </a:solidFill>
+                <a:latin typeface="Times New Roman" pitchFamily="18" charset="0"/>
+                <a:cs typeface="Times New Roman" pitchFamily="18" charset="0"/>
+              </a:rPr>
+              <a:t>Interface</a:t>
+            </a:r>
+          </a:p>
+          <a:p>
+            <a:pPr algn="ctr"/>
+            <a:r>
+              <a:rPr lang="vi-VN" sz="1200" b="1" noProof="1" smtClean="0">
+                <a:solidFill>
+                  <a:schemeClr val="tx2"/>
+                </a:solidFill>
+                <a:latin typeface="Times New Roman" pitchFamily="18" charset="0"/>
+                <a:cs typeface="Times New Roman" pitchFamily="18" charset="0"/>
+              </a:rPr>
+              <a:t>I</a:t>
+            </a:r>
+            <a:r>
+              <a:rPr lang="en-US" sz="1200" b="1" noProof="1" smtClean="0">
+                <a:solidFill>
+                  <a:schemeClr val="tx2"/>
+                </a:solidFill>
+                <a:latin typeface="Times New Roman" pitchFamily="18" charset="0"/>
+                <a:cs typeface="Times New Roman" pitchFamily="18" charset="0"/>
+              </a:rPr>
+              <a:t>MatchingTool</a:t>
+            </a:r>
+            <a:endParaRPr lang="vi-VN" sz="1200" b="1" noProof="1">
+              <a:solidFill>
+                <a:schemeClr val="tx2"/>
+              </a:solidFill>
+              <a:latin typeface="Times New Roman" pitchFamily="18" charset="0"/>
+              <a:cs typeface="Times New Roman" pitchFamily="18" charset="0"/>
+            </a:endParaRPr>
+          </a:p>
+        </p:txBody>
+      </p:sp>
+      <p:sp>
+        <p:nvSpPr>
+          <p:cNvPr id="12" name="Rectangle 11"/>
+          <p:cNvSpPr/>
+          <p:nvPr/>
+        </p:nvSpPr>
+        <p:spPr>
+          <a:xfrm>
+            <a:off x="5997038" y="3953481"/>
+            <a:ext cx="1752600" cy="457200"/>
+          </a:xfrm>
+          <a:prstGeom prst="rect">
+            <a:avLst/>
+          </a:prstGeom>
+        </p:spPr>
+        <p:style>
+          <a:lnRef idx="1">
+            <a:schemeClr val="dk1"/>
+          </a:lnRef>
+          <a:fillRef idx="2">
+            <a:schemeClr val="dk1"/>
+          </a:fillRef>
+          <a:effectRef idx="1">
+            <a:schemeClr val="dk1"/>
+          </a:effectRef>
+          <a:fontRef idx="minor">
+            <a:schemeClr val="dk1"/>
+          </a:fontRef>
+        </p:style>
+        <p:txBody>
+          <a:bodyPr rtlCol="0" anchor="ctr"/>
+          <a:lstStyle/>
+          <a:p>
+            <a:pPr algn="ctr"/>
+            <a:r>
+              <a:rPr lang="en-US" sz="1200" b="1" noProof="1" smtClean="0">
+                <a:solidFill>
+                  <a:schemeClr val="tx1"/>
+                </a:solidFill>
+                <a:latin typeface="Times New Roman" pitchFamily="18" charset="0"/>
+                <a:cs typeface="Times New Roman" pitchFamily="18" charset="0"/>
+              </a:rPr>
+              <a:t>AnalysisServices</a:t>
+            </a:r>
+            <a:endParaRPr lang="en-US" sz="1200" b="1" noProof="1">
+              <a:solidFill>
+                <a:schemeClr val="tx1"/>
+              </a:solidFill>
+              <a:latin typeface="Times New Roman" pitchFamily="18" charset="0"/>
+              <a:cs typeface="Times New Roman" pitchFamily="18" charset="0"/>
+            </a:endParaRPr>
+          </a:p>
+        </p:txBody>
+      </p:sp>
+      <p:sp>
+        <p:nvSpPr>
+          <p:cNvPr id="13" name="Rectangle 12"/>
+          <p:cNvSpPr/>
+          <p:nvPr/>
+        </p:nvSpPr>
+        <p:spPr>
+          <a:xfrm>
+            <a:off x="5997038" y="4601430"/>
+            <a:ext cx="1752600" cy="457200"/>
+          </a:xfrm>
+          <a:prstGeom prst="rect">
+            <a:avLst/>
+          </a:prstGeom>
+        </p:spPr>
+        <p:style>
+          <a:lnRef idx="1">
+            <a:schemeClr val="accent1"/>
+          </a:lnRef>
+          <a:fillRef idx="2">
+            <a:schemeClr val="accent1"/>
+          </a:fillRef>
+          <a:effectRef idx="1">
+            <a:schemeClr val="accent1"/>
+          </a:effectRef>
+          <a:fontRef idx="minor">
+            <a:schemeClr val="dk1"/>
+          </a:fontRef>
+        </p:style>
+        <p:txBody>
+          <a:bodyPr rtlCol="0" anchor="ctr"/>
+          <a:lstStyle/>
+          <a:p>
+            <a:pPr algn="ctr"/>
+            <a:r>
+              <a:rPr lang="en-US" sz="1200" b="1" noProof="1" smtClean="0">
+                <a:solidFill>
+                  <a:schemeClr val="tx1"/>
+                </a:solidFill>
+                <a:latin typeface="Times New Roman" pitchFamily="18" charset="0"/>
+                <a:cs typeface="Times New Roman" pitchFamily="18" charset="0"/>
+              </a:rPr>
+              <a:t>DecisionTreeStructure</a:t>
+            </a:r>
+            <a:endParaRPr lang="en-US" sz="1200" b="1" noProof="1">
+              <a:solidFill>
+                <a:schemeClr val="tx1"/>
+              </a:solidFill>
+              <a:latin typeface="Times New Roman" pitchFamily="18" charset="0"/>
+              <a:cs typeface="Times New Roman" pitchFamily="18" charset="0"/>
+            </a:endParaRPr>
+          </a:p>
+        </p:txBody>
+      </p:sp>
+      <p:sp>
+        <p:nvSpPr>
+          <p:cNvPr id="14" name="Right Triangle 13"/>
+          <p:cNvSpPr/>
+          <p:nvPr/>
+        </p:nvSpPr>
+        <p:spPr>
+          <a:xfrm rot="8006167" flipH="1">
+            <a:off x="5305474" y="4081403"/>
+            <a:ext cx="194991" cy="201357"/>
+          </a:xfrm>
+          <a:prstGeom prst="rtTriangle">
+            <a:avLst/>
+          </a:prstGeom>
+        </p:spPr>
+        <p:style>
+          <a:lnRef idx="2">
+            <a:schemeClr val="accent1"/>
+          </a:lnRef>
+          <a:fillRef idx="1">
+            <a:schemeClr val="lt1"/>
+          </a:fillRef>
+          <a:effectRef idx="0">
+            <a:schemeClr val="accent1"/>
+          </a:effectRef>
+          <a:fontRef idx="minor">
+            <a:schemeClr val="dk1"/>
+          </a:fontRef>
+        </p:style>
+        <p:txBody>
+          <a:bodyPr rtlCol="0" anchor="ctr"/>
+          <a:lstStyle/>
+          <a:p>
+            <a:pPr algn="ctr"/>
+            <a:endParaRPr lang="vi-VN"/>
+          </a:p>
+        </p:txBody>
+      </p:sp>
+      <p:cxnSp>
+        <p:nvCxnSpPr>
+          <p:cNvPr id="15" name="Straight Connector 14"/>
+          <p:cNvCxnSpPr>
+            <a:stCxn id="14" idx="5"/>
+            <a:endCxn id="12" idx="1"/>
+          </p:cNvCxnSpPr>
+          <p:nvPr/>
+        </p:nvCxnSpPr>
+        <p:spPr>
+          <a:xfrm>
+            <a:off x="5402969" y="4182081"/>
+            <a:ext cx="594069" cy="0"/>
+          </a:xfrm>
+          <a:prstGeom prst="line">
+            <a:avLst/>
+          </a:prstGeom>
+        </p:spPr>
+        <p:style>
+          <a:lnRef idx="1">
+            <a:schemeClr val="accent1"/>
+          </a:lnRef>
+          <a:fillRef idx="0">
+            <a:schemeClr val="accent1"/>
+          </a:fillRef>
+          <a:effectRef idx="0">
+            <a:schemeClr val="accent1"/>
+          </a:effectRef>
+          <a:fontRef idx="minor">
+            <a:schemeClr val="tx1"/>
+          </a:fontRef>
+        </p:style>
+      </p:cxnSp>
+      <p:sp>
+        <p:nvSpPr>
+          <p:cNvPr id="18" name="Rectangle 17"/>
+          <p:cNvSpPr/>
+          <p:nvPr/>
+        </p:nvSpPr>
+        <p:spPr>
+          <a:xfrm>
+            <a:off x="5977246" y="5382868"/>
+            <a:ext cx="1752600" cy="457200"/>
+          </a:xfrm>
+          <a:prstGeom prst="rect">
+            <a:avLst/>
+          </a:prstGeom>
+        </p:spPr>
+        <p:style>
+          <a:lnRef idx="1">
+            <a:schemeClr val="accent3"/>
+          </a:lnRef>
+          <a:fillRef idx="2">
+            <a:schemeClr val="accent3"/>
+          </a:fillRef>
+          <a:effectRef idx="1">
+            <a:schemeClr val="accent3"/>
+          </a:effectRef>
+          <a:fontRef idx="minor">
+            <a:schemeClr val="dk1"/>
+          </a:fontRef>
+        </p:style>
+        <p:txBody>
+          <a:bodyPr rtlCol="0" anchor="ctr"/>
+          <a:lstStyle/>
+          <a:p>
+            <a:pPr algn="ctr"/>
+            <a:r>
+              <a:rPr lang="en-US" sz="1200" b="1" noProof="1" smtClean="0">
+                <a:solidFill>
+                  <a:schemeClr val="tx1"/>
+                </a:solidFill>
+                <a:latin typeface="Times New Roman" pitchFamily="18" charset="0"/>
+                <a:cs typeface="Times New Roman" pitchFamily="18" charset="0"/>
+              </a:rPr>
+              <a:t>SimilarityTerm</a:t>
+            </a:r>
+            <a:endParaRPr lang="en-US" sz="1200" b="1" noProof="1">
+              <a:solidFill>
+                <a:schemeClr val="tx1"/>
+              </a:solidFill>
+              <a:latin typeface="Times New Roman" pitchFamily="18" charset="0"/>
+              <a:cs typeface="Times New Roman" pitchFamily="18" charset="0"/>
+            </a:endParaRPr>
+          </a:p>
+        </p:txBody>
+      </p:sp>
+      <p:sp>
+        <p:nvSpPr>
+          <p:cNvPr id="19" name="Right Triangle 18"/>
+          <p:cNvSpPr/>
+          <p:nvPr/>
+        </p:nvSpPr>
+        <p:spPr>
+          <a:xfrm rot="8006167" flipH="1">
+            <a:off x="5285682" y="5510790"/>
+            <a:ext cx="194991" cy="201357"/>
+          </a:xfrm>
+          <a:prstGeom prst="rtTriangle">
+            <a:avLst/>
+          </a:prstGeom>
+        </p:spPr>
+        <p:style>
+          <a:lnRef idx="2">
+            <a:schemeClr val="accent1"/>
+          </a:lnRef>
+          <a:fillRef idx="1">
+            <a:schemeClr val="lt1"/>
+          </a:fillRef>
+          <a:effectRef idx="0">
+            <a:schemeClr val="accent1"/>
+          </a:effectRef>
+          <a:fontRef idx="minor">
+            <a:schemeClr val="dk1"/>
+          </a:fontRef>
+        </p:style>
+        <p:txBody>
+          <a:bodyPr rtlCol="0" anchor="ctr"/>
+          <a:lstStyle/>
+          <a:p>
+            <a:pPr algn="ctr"/>
+            <a:endParaRPr lang="vi-VN"/>
+          </a:p>
+        </p:txBody>
+      </p:sp>
+      <p:cxnSp>
+        <p:nvCxnSpPr>
+          <p:cNvPr id="20" name="Straight Connector 19"/>
+          <p:cNvCxnSpPr>
+            <a:stCxn id="19" idx="5"/>
+            <a:endCxn id="18" idx="1"/>
+          </p:cNvCxnSpPr>
+          <p:nvPr/>
+        </p:nvCxnSpPr>
+        <p:spPr>
+          <a:xfrm>
+            <a:off x="5383177" y="5611468"/>
+            <a:ext cx="594069" cy="0"/>
+          </a:xfrm>
+          <a:prstGeom prst="line">
+            <a:avLst/>
+          </a:prstGeom>
+        </p:spPr>
+        <p:style>
+          <a:lnRef idx="1">
+            <a:schemeClr val="accent1"/>
+          </a:lnRef>
+          <a:fillRef idx="0">
+            <a:schemeClr val="accent1"/>
+          </a:fillRef>
+          <a:effectRef idx="0">
+            <a:schemeClr val="accent1"/>
+          </a:effectRef>
+          <a:fontRef idx="minor">
+            <a:schemeClr val="tx1"/>
+          </a:fontRef>
+        </p:style>
+      </p:cxnSp>
+      <p:sp>
+        <p:nvSpPr>
+          <p:cNvPr id="21" name="Rectangle 20"/>
+          <p:cNvSpPr/>
+          <p:nvPr/>
+        </p:nvSpPr>
+        <p:spPr>
+          <a:xfrm>
+            <a:off x="5960422" y="6019375"/>
+            <a:ext cx="1752600" cy="457200"/>
+          </a:xfrm>
+          <a:prstGeom prst="rect">
+            <a:avLst/>
+          </a:prstGeom>
+        </p:spPr>
+        <p:style>
+          <a:lnRef idx="1">
+            <a:schemeClr val="accent6"/>
+          </a:lnRef>
+          <a:fillRef idx="2">
+            <a:schemeClr val="accent6"/>
+          </a:fillRef>
+          <a:effectRef idx="1">
+            <a:schemeClr val="accent6"/>
+          </a:effectRef>
+          <a:fontRef idx="minor">
+            <a:schemeClr val="dk1"/>
+          </a:fontRef>
+        </p:style>
+        <p:txBody>
+          <a:bodyPr rtlCol="0" anchor="ctr"/>
+          <a:lstStyle/>
+          <a:p>
+            <a:pPr algn="ctr"/>
+            <a:r>
+              <a:rPr lang="en-US" sz="1200" b="1" noProof="1" smtClean="0">
+                <a:solidFill>
+                  <a:schemeClr val="tx1"/>
+                </a:solidFill>
+                <a:latin typeface="Times New Roman" pitchFamily="18" charset="0"/>
+                <a:cs typeface="Times New Roman" pitchFamily="18" charset="0"/>
+              </a:rPr>
+              <a:t>MatchingTool</a:t>
+            </a:r>
+            <a:endParaRPr lang="en-US" sz="1200" b="1" noProof="1">
+              <a:solidFill>
+                <a:schemeClr val="tx1"/>
+              </a:solidFill>
+              <a:latin typeface="Times New Roman" pitchFamily="18" charset="0"/>
+              <a:cs typeface="Times New Roman" pitchFamily="18" charset="0"/>
+            </a:endParaRPr>
+          </a:p>
+        </p:txBody>
+      </p:sp>
+      <p:sp>
+        <p:nvSpPr>
+          <p:cNvPr id="22" name="Right Triangle 21"/>
+          <p:cNvSpPr/>
+          <p:nvPr/>
+        </p:nvSpPr>
+        <p:spPr>
+          <a:xfrm rot="8006167" flipH="1">
+            <a:off x="5268858" y="6147297"/>
+            <a:ext cx="194991" cy="201357"/>
+          </a:xfrm>
+          <a:prstGeom prst="rtTriangle">
+            <a:avLst/>
+          </a:prstGeom>
+        </p:spPr>
+        <p:style>
+          <a:lnRef idx="2">
+            <a:schemeClr val="accent1"/>
+          </a:lnRef>
+          <a:fillRef idx="1">
+            <a:schemeClr val="lt1"/>
+          </a:fillRef>
+          <a:effectRef idx="0">
+            <a:schemeClr val="accent1"/>
+          </a:effectRef>
+          <a:fontRef idx="minor">
+            <a:schemeClr val="dk1"/>
+          </a:fontRef>
+        </p:style>
+        <p:txBody>
+          <a:bodyPr rtlCol="0" anchor="ctr"/>
+          <a:lstStyle/>
+          <a:p>
+            <a:pPr algn="ctr"/>
+            <a:endParaRPr lang="vi-VN"/>
+          </a:p>
+        </p:txBody>
+      </p:sp>
+      <p:cxnSp>
+        <p:nvCxnSpPr>
+          <p:cNvPr id="23" name="Straight Connector 22"/>
+          <p:cNvCxnSpPr>
+            <a:stCxn id="22" idx="5"/>
+            <a:endCxn id="21" idx="1"/>
+          </p:cNvCxnSpPr>
+          <p:nvPr/>
+        </p:nvCxnSpPr>
+        <p:spPr>
+          <a:xfrm>
+            <a:off x="5366353" y="6247975"/>
+            <a:ext cx="594069" cy="0"/>
+          </a:xfrm>
+          <a:prstGeom prst="line">
+            <a:avLst/>
+          </a:prstGeom>
+        </p:spPr>
+        <p:style>
+          <a:lnRef idx="1">
+            <a:schemeClr val="accent1"/>
+          </a:lnRef>
+          <a:fillRef idx="0">
+            <a:schemeClr val="accent1"/>
+          </a:fillRef>
+          <a:effectRef idx="0">
+            <a:schemeClr val="accent1"/>
+          </a:effectRef>
+          <a:fontRef idx="minor">
+            <a:schemeClr val="tx1"/>
+          </a:fontRef>
+        </p:style>
+      </p:cxnSp>
+      <p:cxnSp>
+        <p:nvCxnSpPr>
+          <p:cNvPr id="24" name="Straight Connector 23"/>
+          <p:cNvCxnSpPr>
+            <a:endCxn id="5" idx="1"/>
+          </p:cNvCxnSpPr>
+          <p:nvPr/>
+        </p:nvCxnSpPr>
+        <p:spPr>
+          <a:xfrm>
+            <a:off x="2209800" y="4043772"/>
+            <a:ext cx="1275910" cy="131791"/>
+          </a:xfrm>
+          <a:prstGeom prst="line">
+            <a:avLst/>
+          </a:prstGeom>
+        </p:spPr>
+        <p:style>
+          <a:lnRef idx="1">
+            <a:schemeClr val="accent1"/>
+          </a:lnRef>
+          <a:fillRef idx="0">
+            <a:schemeClr val="accent1"/>
+          </a:fillRef>
+          <a:effectRef idx="0">
+            <a:schemeClr val="accent1"/>
+          </a:effectRef>
+          <a:fontRef idx="minor">
+            <a:schemeClr val="tx1"/>
+          </a:fontRef>
+        </p:style>
+      </p:cxnSp>
+      <p:cxnSp>
+        <p:nvCxnSpPr>
+          <p:cNvPr id="25" name="Straight Connector 24"/>
+          <p:cNvCxnSpPr>
+            <a:endCxn id="6" idx="1"/>
+          </p:cNvCxnSpPr>
+          <p:nvPr/>
+        </p:nvCxnSpPr>
+        <p:spPr>
+          <a:xfrm>
+            <a:off x="2209800" y="4043772"/>
+            <a:ext cx="1275910" cy="795337"/>
+          </a:xfrm>
+          <a:prstGeom prst="line">
+            <a:avLst/>
+          </a:prstGeom>
+        </p:spPr>
+        <p:style>
+          <a:lnRef idx="1">
+            <a:schemeClr val="accent1"/>
+          </a:lnRef>
+          <a:fillRef idx="0">
+            <a:schemeClr val="accent1"/>
+          </a:fillRef>
+          <a:effectRef idx="0">
+            <a:schemeClr val="accent1"/>
+          </a:effectRef>
+          <a:fontRef idx="minor">
+            <a:schemeClr val="tx1"/>
+          </a:fontRef>
+        </p:style>
+      </p:cxnSp>
+      <p:cxnSp>
+        <p:nvCxnSpPr>
+          <p:cNvPr id="26" name="Straight Connector 25"/>
+          <p:cNvCxnSpPr>
+            <a:endCxn id="10" idx="1"/>
+          </p:cNvCxnSpPr>
+          <p:nvPr/>
+        </p:nvCxnSpPr>
+        <p:spPr>
+          <a:xfrm>
+            <a:off x="2209800" y="4043772"/>
+            <a:ext cx="1274314" cy="1567696"/>
+          </a:xfrm>
+          <a:prstGeom prst="line">
+            <a:avLst/>
+          </a:prstGeom>
+        </p:spPr>
+        <p:style>
+          <a:lnRef idx="1">
+            <a:schemeClr val="accent1"/>
+          </a:lnRef>
+          <a:fillRef idx="0">
+            <a:schemeClr val="accent1"/>
+          </a:fillRef>
+          <a:effectRef idx="0">
+            <a:schemeClr val="accent1"/>
+          </a:effectRef>
+          <a:fontRef idx="minor">
+            <a:schemeClr val="tx1"/>
+          </a:fontRef>
+        </p:style>
+      </p:cxnSp>
+      <p:cxnSp>
+        <p:nvCxnSpPr>
+          <p:cNvPr id="27" name="Straight Connector 26"/>
+          <p:cNvCxnSpPr>
+            <a:endCxn id="11" idx="1"/>
+          </p:cNvCxnSpPr>
+          <p:nvPr/>
+        </p:nvCxnSpPr>
+        <p:spPr>
+          <a:xfrm>
+            <a:off x="2209800" y="4043772"/>
+            <a:ext cx="1275910" cy="2204203"/>
+          </a:xfrm>
+          <a:prstGeom prst="line">
+            <a:avLst/>
+          </a:prstGeom>
+        </p:spPr>
+        <p:style>
+          <a:lnRef idx="1">
+            <a:schemeClr val="accent1"/>
+          </a:lnRef>
+          <a:fillRef idx="0">
+            <a:schemeClr val="accent1"/>
+          </a:fillRef>
+          <a:effectRef idx="0">
+            <a:schemeClr val="accent1"/>
+          </a:effectRef>
+          <a:fontRef idx="minor">
+            <a:schemeClr val="tx1"/>
+          </a:fontRef>
+        </p:style>
+      </p:cxnSp>
+      <p:cxnSp>
+        <p:nvCxnSpPr>
+          <p:cNvPr id="28" name="Straight Connector 27"/>
+          <p:cNvCxnSpPr>
+            <a:endCxn id="9" idx="1"/>
+          </p:cNvCxnSpPr>
+          <p:nvPr/>
+        </p:nvCxnSpPr>
+        <p:spPr>
+          <a:xfrm flipV="1">
+            <a:off x="2209800" y="1910517"/>
+            <a:ext cx="1263814" cy="2127886"/>
+          </a:xfrm>
+          <a:prstGeom prst="line">
+            <a:avLst/>
+          </a:prstGeom>
+        </p:spPr>
+        <p:style>
+          <a:lnRef idx="1">
+            <a:schemeClr val="accent1"/>
+          </a:lnRef>
+          <a:fillRef idx="0">
+            <a:schemeClr val="accent1"/>
+          </a:fillRef>
+          <a:effectRef idx="0">
+            <a:schemeClr val="accent1"/>
+          </a:effectRef>
+          <a:fontRef idx="minor">
+            <a:schemeClr val="tx1"/>
+          </a:fontRef>
+        </p:style>
+      </p:cxnSp>
+      <p:sp>
+        <p:nvSpPr>
+          <p:cNvPr id="29" name="Rectangle 28"/>
+          <p:cNvSpPr/>
+          <p:nvPr/>
+        </p:nvSpPr>
+        <p:spPr>
+          <a:xfrm>
+            <a:off x="3473614" y="3149918"/>
+            <a:ext cx="1752600" cy="457200"/>
+          </a:xfrm>
+          <a:prstGeom prst="rect">
+            <a:avLst/>
+          </a:prstGeom>
+        </p:spPr>
+        <p:style>
+          <a:lnRef idx="1">
+            <a:schemeClr val="accent2"/>
+          </a:lnRef>
+          <a:fillRef idx="2">
+            <a:schemeClr val="accent2"/>
+          </a:fillRef>
+          <a:effectRef idx="1">
+            <a:schemeClr val="accent2"/>
+          </a:effectRef>
+          <a:fontRef idx="minor">
+            <a:schemeClr val="dk1"/>
+          </a:fontRef>
+        </p:style>
+        <p:txBody>
+          <a:bodyPr rtlCol="0" anchor="ctr"/>
+          <a:lstStyle/>
+          <a:p>
+            <a:pPr algn="ctr"/>
+            <a:r>
+              <a:rPr lang="en-US" sz="1200" b="1" dirty="0" smtClean="0">
+                <a:solidFill>
+                  <a:schemeClr val="tx2"/>
+                </a:solidFill>
+                <a:latin typeface="Times New Roman" pitchFamily="18" charset="0"/>
+                <a:cs typeface="Times New Roman" pitchFamily="18" charset="0"/>
+              </a:rPr>
+              <a:t>Interface </a:t>
+            </a:r>
+            <a:r>
+              <a:rPr lang="en-US" sz="1200" b="1" noProof="1" smtClean="0">
+                <a:solidFill>
+                  <a:schemeClr val="tx2"/>
+                </a:solidFill>
+                <a:latin typeface="Times New Roman" pitchFamily="18" charset="0"/>
+                <a:cs typeface="Times New Roman" pitchFamily="18" charset="0"/>
+              </a:rPr>
+              <a:t>IJobZoomDataAccess</a:t>
+            </a:r>
+            <a:endParaRPr lang="en-US" sz="1200" b="1" noProof="1">
+              <a:solidFill>
+                <a:schemeClr val="tx2"/>
+              </a:solidFill>
+              <a:latin typeface="Times New Roman" pitchFamily="18" charset="0"/>
+              <a:cs typeface="Times New Roman" pitchFamily="18" charset="0"/>
+            </a:endParaRPr>
+          </a:p>
+        </p:txBody>
+      </p:sp>
+      <p:sp>
+        <p:nvSpPr>
+          <p:cNvPr id="30" name="Rectangle 29"/>
+          <p:cNvSpPr/>
+          <p:nvPr/>
+        </p:nvSpPr>
+        <p:spPr>
+          <a:xfrm>
+            <a:off x="5997038" y="3149918"/>
+            <a:ext cx="1752600" cy="457200"/>
+          </a:xfrm>
+          <a:prstGeom prst="rect">
+            <a:avLst/>
+          </a:prstGeom>
+        </p:spPr>
+        <p:style>
+          <a:lnRef idx="1">
+            <a:schemeClr val="accent4"/>
+          </a:lnRef>
+          <a:fillRef idx="2">
+            <a:schemeClr val="accent4"/>
+          </a:fillRef>
+          <a:effectRef idx="1">
+            <a:schemeClr val="accent4"/>
+          </a:effectRef>
+          <a:fontRef idx="minor">
+            <a:schemeClr val="dk1"/>
+          </a:fontRef>
+        </p:style>
+        <p:txBody>
+          <a:bodyPr rtlCol="0" anchor="ctr"/>
+          <a:lstStyle/>
+          <a:p>
+            <a:pPr algn="ctr"/>
+            <a:r>
+              <a:rPr lang="en-US" sz="1200" b="1" noProof="1" smtClean="0">
+                <a:solidFill>
+                  <a:schemeClr val="tx1"/>
+                </a:solidFill>
+                <a:latin typeface="Times New Roman" pitchFamily="18" charset="0"/>
+                <a:cs typeface="Times New Roman" pitchFamily="18" charset="0"/>
+              </a:rPr>
+              <a:t>JobZoomDataAccess</a:t>
+            </a:r>
+            <a:endParaRPr lang="en-US" sz="1200" b="1" noProof="1">
+              <a:solidFill>
+                <a:schemeClr val="tx1"/>
+              </a:solidFill>
+              <a:latin typeface="Times New Roman" pitchFamily="18" charset="0"/>
+              <a:cs typeface="Times New Roman" pitchFamily="18" charset="0"/>
+            </a:endParaRPr>
+          </a:p>
+        </p:txBody>
+      </p:sp>
+      <p:cxnSp>
+        <p:nvCxnSpPr>
+          <p:cNvPr id="31" name="Straight Connector 30"/>
+          <p:cNvCxnSpPr>
+            <a:endCxn id="29" idx="1"/>
+          </p:cNvCxnSpPr>
+          <p:nvPr/>
+        </p:nvCxnSpPr>
+        <p:spPr>
+          <a:xfrm flipV="1">
+            <a:off x="2209800" y="3378518"/>
+            <a:ext cx="1263814" cy="665254"/>
+          </a:xfrm>
+          <a:prstGeom prst="line">
+            <a:avLst/>
+          </a:prstGeom>
+        </p:spPr>
+        <p:style>
+          <a:lnRef idx="1">
+            <a:schemeClr val="accent1"/>
+          </a:lnRef>
+          <a:fillRef idx="0">
+            <a:schemeClr val="accent1"/>
+          </a:fillRef>
+          <a:effectRef idx="0">
+            <a:schemeClr val="accent1"/>
+          </a:effectRef>
+          <a:fontRef idx="minor">
+            <a:schemeClr val="tx1"/>
+          </a:fontRef>
+        </p:style>
+      </p:cxnSp>
+      <p:sp>
+        <p:nvSpPr>
+          <p:cNvPr id="32" name="Right Triangle 31"/>
+          <p:cNvSpPr/>
+          <p:nvPr/>
+        </p:nvSpPr>
+        <p:spPr>
+          <a:xfrm rot="8006167" flipH="1">
+            <a:off x="5279358" y="3277840"/>
+            <a:ext cx="194991" cy="201357"/>
+          </a:xfrm>
+          <a:prstGeom prst="rtTriangle">
+            <a:avLst/>
+          </a:prstGeom>
+        </p:spPr>
+        <p:style>
+          <a:lnRef idx="2">
+            <a:schemeClr val="accent1"/>
+          </a:lnRef>
+          <a:fillRef idx="1">
+            <a:schemeClr val="lt1"/>
+          </a:fillRef>
+          <a:effectRef idx="0">
+            <a:schemeClr val="accent1"/>
+          </a:effectRef>
+          <a:fontRef idx="minor">
+            <a:schemeClr val="dk1"/>
+          </a:fontRef>
+        </p:style>
+        <p:txBody>
+          <a:bodyPr rtlCol="0" anchor="ctr"/>
+          <a:lstStyle/>
+          <a:p>
+            <a:pPr algn="ctr"/>
+            <a:endParaRPr lang="vi-VN"/>
+          </a:p>
+        </p:txBody>
+      </p:sp>
+      <p:cxnSp>
+        <p:nvCxnSpPr>
+          <p:cNvPr id="33" name="Straight Connector 32"/>
+          <p:cNvCxnSpPr>
+            <a:stCxn id="32" idx="5"/>
+          </p:cNvCxnSpPr>
+          <p:nvPr/>
+        </p:nvCxnSpPr>
+        <p:spPr>
+          <a:xfrm>
+            <a:off x="5376853" y="3378518"/>
+            <a:ext cx="594069" cy="0"/>
+          </a:xfrm>
+          <a:prstGeom prst="line">
+            <a:avLst/>
+          </a:prstGeom>
+        </p:spPr>
+        <p:style>
+          <a:lnRef idx="1">
+            <a:schemeClr val="accent1"/>
+          </a:lnRef>
+          <a:fillRef idx="0">
+            <a:schemeClr val="accent1"/>
+          </a:fillRef>
+          <a:effectRef idx="0">
+            <a:schemeClr val="accent1"/>
+          </a:effectRef>
+          <a:fontRef idx="minor">
+            <a:schemeClr val="tx1"/>
+          </a:fontRef>
+        </p:style>
+      </p:cxnSp>
+      <p:cxnSp>
+        <p:nvCxnSpPr>
+          <p:cNvPr id="35" name="Straight Connector 34"/>
+          <p:cNvCxnSpPr/>
+          <p:nvPr/>
+        </p:nvCxnSpPr>
+        <p:spPr>
+          <a:xfrm flipV="1">
+            <a:off x="2209800" y="2712783"/>
+            <a:ext cx="1266783" cy="1330989"/>
+          </a:xfrm>
+          <a:prstGeom prst="line">
+            <a:avLst/>
+          </a:prstGeom>
+        </p:spPr>
+        <p:style>
+          <a:lnRef idx="1">
+            <a:schemeClr val="accent1"/>
+          </a:lnRef>
+          <a:fillRef idx="0">
+            <a:schemeClr val="accent1"/>
+          </a:fillRef>
+          <a:effectRef idx="0">
+            <a:schemeClr val="accent1"/>
+          </a:effectRef>
+          <a:fontRef idx="minor">
+            <a:schemeClr val="tx1"/>
+          </a:fontRef>
+        </p:style>
+      </p:cxnSp>
+      <p:pic>
+        <p:nvPicPr>
+          <p:cNvPr id="36" name="Picture 35"/>
+          <p:cNvPicPr>
+            <a:picLocks noChangeAspect="1"/>
+          </p:cNvPicPr>
+          <p:nvPr/>
+        </p:nvPicPr>
+        <p:blipFill>
+          <a:blip r:embed="rId2" cstate="print">
+            <a:extLst>
+              <a:ext uri="{28A0092B-C50C-407E-A947-70E740481C1C}">
+                <a14:useLocalDpi xmlns:a14="http://schemas.microsoft.com/office/drawing/2010/main" val="0"/>
+              </a:ext>
+            </a:extLst>
+          </a:blip>
+          <a:stretch>
+            <a:fillRect/>
+          </a:stretch>
+        </p:blipFill>
+        <p:spPr>
+          <a:xfrm>
+            <a:off x="1196340" y="3672643"/>
+            <a:ext cx="731520" cy="731520"/>
+          </a:xfrm>
+          <a:prstGeom prst="rect">
+            <a:avLst/>
+          </a:prstGeom>
+        </p:spPr>
+      </p:pic>
+      <p:sp>
+        <p:nvSpPr>
+          <p:cNvPr id="37" name="Rectangle 36"/>
+          <p:cNvSpPr/>
+          <p:nvPr/>
+        </p:nvSpPr>
+        <p:spPr>
+          <a:xfrm>
+            <a:off x="6019800" y="2438400"/>
+            <a:ext cx="1752600" cy="457200"/>
+          </a:xfrm>
+          <a:prstGeom prst="rect">
+            <a:avLst/>
+          </a:prstGeom>
+        </p:spPr>
+        <p:style>
+          <a:lnRef idx="1">
+            <a:schemeClr val="accent5"/>
+          </a:lnRef>
+          <a:fillRef idx="2">
+            <a:schemeClr val="accent5"/>
+          </a:fillRef>
+          <a:effectRef idx="1">
+            <a:schemeClr val="accent5"/>
+          </a:effectRef>
+          <a:fontRef idx="minor">
+            <a:schemeClr val="dk1"/>
+          </a:fontRef>
+        </p:style>
+        <p:txBody>
+          <a:bodyPr rtlCol="0" anchor="ctr"/>
+          <a:lstStyle/>
+          <a:p>
+            <a:pPr algn="ctr"/>
+            <a:r>
+              <a:rPr lang="en-US" sz="1200" b="1" noProof="1" smtClean="0">
+                <a:solidFill>
+                  <a:schemeClr val="tx2"/>
+                </a:solidFill>
+                <a:latin typeface="Times New Roman" pitchFamily="18" charset="0"/>
+                <a:cs typeface="Times New Roman" pitchFamily="18" charset="0"/>
+              </a:rPr>
+              <a:t>Abstract Hierarchy Tree Class</a:t>
+            </a:r>
+            <a:endParaRPr lang="vi-VN" sz="1200" b="1" noProof="1">
+              <a:solidFill>
+                <a:schemeClr val="tx2"/>
+              </a:solidFill>
+              <a:latin typeface="Times New Roman" pitchFamily="18" charset="0"/>
+              <a:cs typeface="Times New Roman" pitchFamily="18" charset="0"/>
+            </a:endParaRPr>
+          </a:p>
+        </p:txBody>
+      </p:sp>
+      <p:sp>
+        <p:nvSpPr>
+          <p:cNvPr id="39" name="Right Triangle 38"/>
+          <p:cNvSpPr/>
+          <p:nvPr/>
+        </p:nvSpPr>
+        <p:spPr>
+          <a:xfrm rot="8006167" flipH="1">
+            <a:off x="5328236" y="2612105"/>
+            <a:ext cx="194991" cy="201357"/>
+          </a:xfrm>
+          <a:prstGeom prst="rtTriangle">
+            <a:avLst/>
+          </a:prstGeom>
+        </p:spPr>
+        <p:style>
+          <a:lnRef idx="2">
+            <a:schemeClr val="accent1"/>
+          </a:lnRef>
+          <a:fillRef idx="1">
+            <a:schemeClr val="lt1"/>
+          </a:fillRef>
+          <a:effectRef idx="0">
+            <a:schemeClr val="accent1"/>
+          </a:effectRef>
+          <a:fontRef idx="minor">
+            <a:schemeClr val="dk1"/>
+          </a:fontRef>
+        </p:style>
+        <p:txBody>
+          <a:bodyPr rtlCol="0" anchor="ctr"/>
+          <a:lstStyle/>
+          <a:p>
+            <a:pPr algn="ctr"/>
+            <a:endParaRPr lang="vi-VN"/>
+          </a:p>
+        </p:txBody>
+      </p:sp>
+      <p:cxnSp>
+        <p:nvCxnSpPr>
+          <p:cNvPr id="40" name="Straight Connector 39"/>
+          <p:cNvCxnSpPr>
+            <a:stCxn id="39" idx="5"/>
+          </p:cNvCxnSpPr>
+          <p:nvPr/>
+        </p:nvCxnSpPr>
+        <p:spPr>
+          <a:xfrm>
+            <a:off x="5425731" y="2712783"/>
+            <a:ext cx="594069" cy="0"/>
+          </a:xfrm>
+          <a:prstGeom prst="line">
+            <a:avLst/>
+          </a:prstGeom>
+        </p:spPr>
+        <p:style>
+          <a:lnRef idx="1">
+            <a:schemeClr val="accent1"/>
+          </a:lnRef>
+          <a:fillRef idx="0">
+            <a:schemeClr val="accent1"/>
+          </a:fillRef>
+          <a:effectRef idx="0">
+            <a:schemeClr val="accent1"/>
+          </a:effectRef>
+          <a:fontRef idx="minor">
+            <a:schemeClr val="tx1"/>
+          </a:fontRef>
+        </p:style>
+      </p:cxnSp>
+      <p:sp>
+        <p:nvSpPr>
+          <p:cNvPr id="41" name="Right Triangle 40"/>
+          <p:cNvSpPr/>
+          <p:nvPr/>
+        </p:nvSpPr>
+        <p:spPr>
+          <a:xfrm rot="8006167" flipH="1">
+            <a:off x="5267668" y="4753533"/>
+            <a:ext cx="194991" cy="201357"/>
+          </a:xfrm>
+          <a:prstGeom prst="rtTriangle">
+            <a:avLst/>
+          </a:prstGeom>
+        </p:spPr>
+        <p:style>
+          <a:lnRef idx="2">
+            <a:schemeClr val="accent1"/>
+          </a:lnRef>
+          <a:fillRef idx="1">
+            <a:schemeClr val="lt1"/>
+          </a:fillRef>
+          <a:effectRef idx="0">
+            <a:schemeClr val="accent1"/>
+          </a:effectRef>
+          <a:fontRef idx="minor">
+            <a:schemeClr val="dk1"/>
+          </a:fontRef>
+        </p:style>
+        <p:txBody>
+          <a:bodyPr rtlCol="0" anchor="ctr"/>
+          <a:lstStyle/>
+          <a:p>
+            <a:pPr algn="ctr"/>
+            <a:endParaRPr lang="vi-VN"/>
+          </a:p>
+        </p:txBody>
+      </p:sp>
+      <p:cxnSp>
+        <p:nvCxnSpPr>
+          <p:cNvPr id="42" name="Straight Connector 41"/>
+          <p:cNvCxnSpPr>
+            <a:stCxn id="41" idx="5"/>
+          </p:cNvCxnSpPr>
+          <p:nvPr/>
+        </p:nvCxnSpPr>
+        <p:spPr>
+          <a:xfrm>
+            <a:off x="5365163" y="4854211"/>
+            <a:ext cx="594069" cy="0"/>
+          </a:xfrm>
+          <a:prstGeom prst="line">
+            <a:avLst/>
+          </a:prstGeom>
+        </p:spPr>
+        <p:style>
+          <a:lnRef idx="1">
+            <a:schemeClr val="accent1"/>
+          </a:lnRef>
+          <a:fillRef idx="0">
+            <a:schemeClr val="accent1"/>
+          </a:fillRef>
+          <a:effectRef idx="0">
+            <a:schemeClr val="accent1"/>
+          </a:effectRef>
+          <a:fontRef idx="minor">
+            <a:schemeClr val="tx1"/>
+          </a:fontRef>
+        </p:style>
+      </p:cxnSp>
+      <p:sp>
+        <p:nvSpPr>
+          <p:cNvPr id="45" name="Rectangle 44"/>
+          <p:cNvSpPr/>
+          <p:nvPr/>
+        </p:nvSpPr>
+        <p:spPr>
+          <a:xfrm>
+            <a:off x="3505200" y="1085182"/>
+            <a:ext cx="1752600" cy="457200"/>
+          </a:xfrm>
+          <a:prstGeom prst="rect">
+            <a:avLst/>
+          </a:prstGeom>
+        </p:spPr>
+        <p:style>
+          <a:lnRef idx="1">
+            <a:schemeClr val="accent5"/>
+          </a:lnRef>
+          <a:fillRef idx="2">
+            <a:schemeClr val="accent5"/>
+          </a:fillRef>
+          <a:effectRef idx="1">
+            <a:schemeClr val="accent5"/>
+          </a:effectRef>
+          <a:fontRef idx="minor">
+            <a:schemeClr val="dk1"/>
+          </a:fontRef>
+        </p:style>
+        <p:txBody>
+          <a:bodyPr rtlCol="0" anchor="ctr"/>
+          <a:lstStyle/>
+          <a:p>
+            <a:pPr algn="ctr"/>
+            <a:r>
+              <a:rPr lang="en-US" sz="1200" b="1" noProof="1" smtClean="0">
+                <a:solidFill>
+                  <a:schemeClr val="tx2"/>
+                </a:solidFill>
+                <a:latin typeface="Times New Roman" pitchFamily="18" charset="0"/>
+                <a:cs typeface="Times New Roman" pitchFamily="18" charset="0"/>
+              </a:rPr>
+              <a:t>Interface</a:t>
+            </a:r>
+          </a:p>
+          <a:p>
+            <a:pPr algn="ctr"/>
+            <a:r>
+              <a:rPr lang="en-US" sz="1200" b="1" noProof="1" smtClean="0">
+                <a:solidFill>
+                  <a:schemeClr val="tx2"/>
+                </a:solidFill>
+                <a:latin typeface="Times New Roman" pitchFamily="18" charset="0"/>
+                <a:cs typeface="Times New Roman" pitchFamily="18" charset="0"/>
+              </a:rPr>
+              <a:t>IAttributeTag</a:t>
+            </a:r>
+            <a:endParaRPr lang="vi-VN" sz="1200" b="1" noProof="1">
+              <a:solidFill>
+                <a:schemeClr val="tx2"/>
+              </a:solidFill>
+              <a:latin typeface="Times New Roman" pitchFamily="18" charset="0"/>
+              <a:cs typeface="Times New Roman" pitchFamily="18" charset="0"/>
+            </a:endParaRPr>
+          </a:p>
+        </p:txBody>
+      </p:sp>
+      <p:sp>
+        <p:nvSpPr>
+          <p:cNvPr id="46" name="Rectangle 45"/>
+          <p:cNvSpPr/>
+          <p:nvPr/>
+        </p:nvSpPr>
+        <p:spPr>
+          <a:xfrm>
+            <a:off x="5955820" y="1085182"/>
+            <a:ext cx="1752600" cy="457200"/>
+          </a:xfrm>
+          <a:prstGeom prst="rect">
+            <a:avLst/>
+          </a:prstGeom>
+        </p:spPr>
+        <p:style>
+          <a:lnRef idx="1">
+            <a:schemeClr val="accent4"/>
+          </a:lnRef>
+          <a:fillRef idx="2">
+            <a:schemeClr val="accent4"/>
+          </a:fillRef>
+          <a:effectRef idx="1">
+            <a:schemeClr val="accent4"/>
+          </a:effectRef>
+          <a:fontRef idx="minor">
+            <a:schemeClr val="dk1"/>
+          </a:fontRef>
+        </p:style>
+        <p:txBody>
+          <a:bodyPr rtlCol="0" anchor="ctr"/>
+          <a:lstStyle/>
+          <a:p>
+            <a:pPr algn="ctr"/>
+            <a:r>
+              <a:rPr lang="en-US" sz="1200" b="1" noProof="1" smtClean="0">
+                <a:solidFill>
+                  <a:schemeClr val="tx1"/>
+                </a:solidFill>
+                <a:latin typeface="Times New Roman" pitchFamily="18" charset="0"/>
+                <a:cs typeface="Times New Roman" pitchFamily="18" charset="0"/>
+              </a:rPr>
+              <a:t>AttributeTag</a:t>
+            </a:r>
+            <a:endParaRPr lang="en-US" sz="1200" b="1" noProof="1">
+              <a:solidFill>
+                <a:schemeClr val="tx1"/>
+              </a:solidFill>
+              <a:latin typeface="Times New Roman" pitchFamily="18" charset="0"/>
+              <a:cs typeface="Times New Roman" pitchFamily="18" charset="0"/>
+            </a:endParaRPr>
+          </a:p>
+        </p:txBody>
+      </p:sp>
+      <p:sp>
+        <p:nvSpPr>
+          <p:cNvPr id="47" name="Right Triangle 46"/>
+          <p:cNvSpPr/>
+          <p:nvPr/>
+        </p:nvSpPr>
+        <p:spPr>
+          <a:xfrm rot="8006167" flipH="1">
+            <a:off x="5305473" y="1213104"/>
+            <a:ext cx="194991" cy="201357"/>
+          </a:xfrm>
+          <a:prstGeom prst="rtTriangle">
+            <a:avLst/>
+          </a:prstGeom>
+        </p:spPr>
+        <p:style>
+          <a:lnRef idx="2">
+            <a:schemeClr val="accent1"/>
+          </a:lnRef>
+          <a:fillRef idx="1">
+            <a:schemeClr val="lt1"/>
+          </a:fillRef>
+          <a:effectRef idx="0">
+            <a:schemeClr val="accent1"/>
+          </a:effectRef>
+          <a:fontRef idx="minor">
+            <a:schemeClr val="dk1"/>
+          </a:fontRef>
+        </p:style>
+        <p:txBody>
+          <a:bodyPr rtlCol="0" anchor="ctr"/>
+          <a:lstStyle/>
+          <a:p>
+            <a:pPr algn="ctr"/>
+            <a:endParaRPr lang="vi-VN"/>
+          </a:p>
+        </p:txBody>
+      </p:sp>
+      <p:cxnSp>
+        <p:nvCxnSpPr>
+          <p:cNvPr id="48" name="Straight Connector 47"/>
+          <p:cNvCxnSpPr>
+            <a:stCxn id="47" idx="5"/>
+            <a:endCxn id="46" idx="1"/>
+          </p:cNvCxnSpPr>
+          <p:nvPr/>
+        </p:nvCxnSpPr>
+        <p:spPr>
+          <a:xfrm>
+            <a:off x="5402968" y="1313782"/>
+            <a:ext cx="552852" cy="0"/>
+          </a:xfrm>
+          <a:prstGeom prst="line">
+            <a:avLst/>
+          </a:prstGeom>
+        </p:spPr>
+        <p:style>
+          <a:lnRef idx="1">
+            <a:schemeClr val="accent1"/>
+          </a:lnRef>
+          <a:fillRef idx="0">
+            <a:schemeClr val="accent1"/>
+          </a:fillRef>
+          <a:effectRef idx="0">
+            <a:schemeClr val="accent1"/>
+          </a:effectRef>
+          <a:fontRef idx="minor">
+            <a:schemeClr val="tx1"/>
+          </a:fontRef>
+        </p:style>
+      </p:cxnSp>
+      <p:cxnSp>
+        <p:nvCxnSpPr>
+          <p:cNvPr id="49" name="Straight Connector 48"/>
+          <p:cNvCxnSpPr>
+            <a:endCxn id="45" idx="1"/>
+          </p:cNvCxnSpPr>
+          <p:nvPr/>
+        </p:nvCxnSpPr>
+        <p:spPr>
+          <a:xfrm flipV="1">
+            <a:off x="2209800" y="1313782"/>
+            <a:ext cx="1295400" cy="2724621"/>
+          </a:xfrm>
+          <a:prstGeom prst="line">
+            <a:avLst/>
+          </a:prstGeom>
+        </p:spPr>
+        <p:style>
+          <a:lnRef idx="1">
+            <a:schemeClr val="accent1"/>
+          </a:lnRef>
+          <a:fillRef idx="0">
+            <a:schemeClr val="accent1"/>
+          </a:fillRef>
+          <a:effectRef idx="0">
+            <a:schemeClr val="accent1"/>
+          </a:effectRef>
+          <a:fontRef idx="minor">
+            <a:schemeClr val="tx1"/>
+          </a:fontRef>
+        </p:style>
+      </p:cxnSp>
+      <p:sp>
+        <p:nvSpPr>
+          <p:cNvPr id="52" name="Rectangle 51"/>
+          <p:cNvSpPr/>
+          <p:nvPr/>
+        </p:nvSpPr>
+        <p:spPr>
+          <a:xfrm>
+            <a:off x="3505200" y="2400594"/>
+            <a:ext cx="1752600" cy="540789"/>
+          </a:xfrm>
+          <a:prstGeom prst="rect">
+            <a:avLst/>
+          </a:prstGeom>
+        </p:spPr>
+        <p:style>
+          <a:lnRef idx="1">
+            <a:schemeClr val="accent5"/>
+          </a:lnRef>
+          <a:fillRef idx="2">
+            <a:schemeClr val="accent5"/>
+          </a:fillRef>
+          <a:effectRef idx="1">
+            <a:schemeClr val="accent5"/>
+          </a:effectRef>
+          <a:fontRef idx="minor">
+            <a:schemeClr val="dk1"/>
+          </a:fontRef>
+        </p:style>
+        <p:txBody>
+          <a:bodyPr rtlCol="0" anchor="ctr"/>
+          <a:lstStyle/>
+          <a:p>
+            <a:pPr algn="ctr"/>
+            <a:r>
+              <a:rPr lang="en-US" sz="1200" b="1" noProof="1" smtClean="0">
+                <a:solidFill>
+                  <a:schemeClr val="tx2"/>
+                </a:solidFill>
+                <a:latin typeface="Times New Roman" pitchFamily="18" charset="0"/>
+                <a:cs typeface="Times New Roman" pitchFamily="18" charset="0"/>
+              </a:rPr>
+              <a:t>Interface</a:t>
+            </a:r>
+          </a:p>
+          <a:p>
+            <a:pPr algn="ctr"/>
+            <a:r>
+              <a:rPr lang="en-US" sz="1200" b="1" noProof="1" smtClean="0">
+                <a:solidFill>
+                  <a:schemeClr val="tx2"/>
+                </a:solidFill>
+                <a:latin typeface="Times New Roman" pitchFamily="18" charset="0"/>
+                <a:cs typeface="Times New Roman" pitchFamily="18" charset="0"/>
+              </a:rPr>
+              <a:t>IAbstract Hierarchy Tree</a:t>
+            </a:r>
+            <a:endParaRPr lang="vi-VN" sz="1200" b="1" noProof="1">
+              <a:solidFill>
+                <a:schemeClr val="tx2"/>
+              </a:solidFill>
+              <a:latin typeface="Times New Roman" pitchFamily="18" charset="0"/>
+              <a:cs typeface="Times New Roman" pitchFamily="18" charset="0"/>
+            </a:endParaRPr>
+          </a:p>
+        </p:txBody>
+      </p:sp>
+    </p:spTree>
+    <p:extLst>
+      <p:ext uri="{BB962C8B-B14F-4D97-AF65-F5344CB8AC3E}">
+        <p14:creationId xmlns:p14="http://schemas.microsoft.com/office/powerpoint/2010/main" val="4147481103"/>
+      </p:ext>
+    </p:extLst>
+  </p:cSld>
+  <p:clrMapOvr>
+    <a:masterClrMapping/>
+  </p:clrMapOvr>
+</p:sld>
+</file>
+
 <file path=ppt/slides/slide3.xml><?xml version="1.0" encoding="utf-8"?>
 <p:sld xmlns:a="http://schemas.openxmlformats.org/drawingml/2006/main" xmlns:r="http://schemas.openxmlformats.org/officeDocument/2006/relationships" xmlns:p="http://schemas.openxmlformats.org/presentationml/2006/main">
   <p:cSld>

</xml_diff>